<commit_message>
Ho modificato l'IDM in base alle nuove specifiche
</commit_message>
<xml_diff>
--- a/1st delivery/C-IDM.pptx
+++ b/1st delivery/C-IDM.pptx
@@ -111,7 +111,7 @@
   </p:defaultTextStyle>
   <p:extLst>
     <p:ext uri="{EFAFB233-063F-42B5-8137-9DF3F51BA10A}">
-      <p15:sldGuideLst xmlns:p15="http://schemas.microsoft.com/office/powerpoint/2012/main">
+      <p15:sldGuideLst xmlns:p15="http://schemas.microsoft.com/office/powerpoint/2012/main" xmlns="">
         <p15:guide id="1" orient="horz" pos="2160" userDrawn="1">
           <p15:clr>
             <a:srgbClr val="A4A3A4"/>
@@ -131,11 +131,7 @@
 <file path=ppt/commentAuthors.xml><?xml version="1.0" encoding="utf-8"?>
 <p:cmAuthorLst xmlns:a="http://schemas.openxmlformats.org/drawingml/2006/main" xmlns:r="http://schemas.openxmlformats.org/officeDocument/2006/relationships" xmlns:p="http://schemas.openxmlformats.org/presentationml/2006/main">
   <p:cmAuthor id="1" name="vito matarazzo" initials="vm" lastIdx="3" clrIdx="0">
-    <p:extLst>
-      <p:ext uri="{19B8F6BF-5375-455C-9EA6-DF929625EA0E}">
-        <p15:presenceInfo xmlns:p15="http://schemas.microsoft.com/office/powerpoint/2012/main" userId="94e264641c93ff50" providerId="Windows Live"/>
-      </p:ext>
-    </p:extLst>
+    <p:extLst/>
   </p:cmAuthor>
 </p:cmAuthorLst>
 </file>
@@ -254,7 +250,7 @@
           <a:p>
             <a:fld id="{51EC9344-52F1-48B5-A731-0BE7C59899F1}" type="datetimeFigureOut">
               <a:rPr lang="it-IT" smtClean="0"/>
-              <a:t>20/04/2016</a:t>
+              <a:t>21/04/2016</a:t>
             </a:fld>
             <a:endParaRPr lang="it-IT"/>
           </a:p>
@@ -877,7 +873,7 @@
             <a:fld id="{DA9D7BA9-B648-4591-B0AE-4433C67759B9}" type="datetimeFigureOut">
               <a:rPr lang="it-IT" smtClean="0"/>
               <a:pPr/>
-              <a:t>20/04/2016</a:t>
+              <a:t>21/04/2016</a:t>
             </a:fld>
             <a:endParaRPr lang="it-IT"/>
           </a:p>
@@ -1044,7 +1040,7 @@
             <a:fld id="{DA9D7BA9-B648-4591-B0AE-4433C67759B9}" type="datetimeFigureOut">
               <a:rPr lang="it-IT" smtClean="0"/>
               <a:pPr/>
-              <a:t>20/04/2016</a:t>
+              <a:t>21/04/2016</a:t>
             </a:fld>
             <a:endParaRPr lang="it-IT"/>
           </a:p>
@@ -1221,7 +1217,7 @@
             <a:fld id="{DA9D7BA9-B648-4591-B0AE-4433C67759B9}" type="datetimeFigureOut">
               <a:rPr lang="it-IT" smtClean="0"/>
               <a:pPr/>
-              <a:t>20/04/2016</a:t>
+              <a:t>21/04/2016</a:t>
             </a:fld>
             <a:endParaRPr lang="it-IT"/>
           </a:p>
@@ -1388,7 +1384,7 @@
             <a:fld id="{DA9D7BA9-B648-4591-B0AE-4433C67759B9}" type="datetimeFigureOut">
               <a:rPr lang="it-IT" smtClean="0"/>
               <a:pPr/>
-              <a:t>20/04/2016</a:t>
+              <a:t>21/04/2016</a:t>
             </a:fld>
             <a:endParaRPr lang="it-IT"/>
           </a:p>
@@ -1631,7 +1627,7 @@
             <a:fld id="{DA9D7BA9-B648-4591-B0AE-4433C67759B9}" type="datetimeFigureOut">
               <a:rPr lang="it-IT" smtClean="0"/>
               <a:pPr/>
-              <a:t>20/04/2016</a:t>
+              <a:t>21/04/2016</a:t>
             </a:fld>
             <a:endParaRPr lang="it-IT"/>
           </a:p>
@@ -1916,7 +1912,7 @@
             <a:fld id="{DA9D7BA9-B648-4591-B0AE-4433C67759B9}" type="datetimeFigureOut">
               <a:rPr lang="it-IT" smtClean="0"/>
               <a:pPr/>
-              <a:t>20/04/2016</a:t>
+              <a:t>21/04/2016</a:t>
             </a:fld>
             <a:endParaRPr lang="it-IT"/>
           </a:p>
@@ -2335,7 +2331,7 @@
             <a:fld id="{DA9D7BA9-B648-4591-B0AE-4433C67759B9}" type="datetimeFigureOut">
               <a:rPr lang="it-IT" smtClean="0"/>
               <a:pPr/>
-              <a:t>20/04/2016</a:t>
+              <a:t>21/04/2016</a:t>
             </a:fld>
             <a:endParaRPr lang="it-IT"/>
           </a:p>
@@ -2450,7 +2446,7 @@
             <a:fld id="{DA9D7BA9-B648-4591-B0AE-4433C67759B9}" type="datetimeFigureOut">
               <a:rPr lang="it-IT" smtClean="0"/>
               <a:pPr/>
-              <a:t>20/04/2016</a:t>
+              <a:t>21/04/2016</a:t>
             </a:fld>
             <a:endParaRPr lang="it-IT"/>
           </a:p>
@@ -2542,7 +2538,7 @@
             <a:fld id="{DA9D7BA9-B648-4591-B0AE-4433C67759B9}" type="datetimeFigureOut">
               <a:rPr lang="it-IT" smtClean="0"/>
               <a:pPr/>
-              <a:t>20/04/2016</a:t>
+              <a:t>21/04/2016</a:t>
             </a:fld>
             <a:endParaRPr lang="it-IT"/>
           </a:p>
@@ -2816,7 +2812,7 @@
             <a:fld id="{DA9D7BA9-B648-4591-B0AE-4433C67759B9}" type="datetimeFigureOut">
               <a:rPr lang="it-IT" smtClean="0"/>
               <a:pPr/>
-              <a:t>20/04/2016</a:t>
+              <a:t>21/04/2016</a:t>
             </a:fld>
             <a:endParaRPr lang="it-IT"/>
           </a:p>
@@ -3066,7 +3062,7 @@
             <a:fld id="{DA9D7BA9-B648-4591-B0AE-4433C67759B9}" type="datetimeFigureOut">
               <a:rPr lang="it-IT" smtClean="0"/>
               <a:pPr/>
-              <a:t>20/04/2016</a:t>
+              <a:t>21/04/2016</a:t>
             </a:fld>
             <a:endParaRPr lang="it-IT"/>
           </a:p>
@@ -3276,7 +3272,7 @@
             <a:fld id="{DA9D7BA9-B648-4591-B0AE-4433C67759B9}" type="datetimeFigureOut">
               <a:rPr lang="it-IT" smtClean="0"/>
               <a:pPr/>
-              <a:t>20/04/2016</a:t>
+              <a:t>21/04/2016</a:t>
             </a:fld>
             <a:endParaRPr lang="it-IT"/>
           </a:p>
@@ -8666,8 +8662,8 @@
             </p:nvSpPr>
             <p:spPr>
               <a:xfrm>
-                <a:off x="9706128" y="5137860"/>
-                <a:ext cx="2486993" cy="954107"/>
+                <a:off x="9735916" y="5202257"/>
+                <a:ext cx="2486993" cy="738664"/>
               </a:xfrm>
               <a:prstGeom prst="rect">
                 <a:avLst/>
@@ -8798,12 +8794,6 @@
               <a:p>
                 <a:r>
                   <a:rPr lang="it-IT" sz="1400" dirty="0" smtClean="0"/>
-                  <a:t>FAQ</a:t>
-                </a:r>
-              </a:p>
-              <a:p>
-                <a:r>
-                  <a:rPr lang="it-IT" sz="1400" dirty="0" smtClean="0"/>
                   <a:t>Form for </a:t>
                 </a:r>
                 <a:r>
@@ -8814,406 +8804,11 @@
                   <a:rPr lang="it-IT" sz="1400" dirty="0" smtClean="0"/>
                   <a:t> to service</a:t>
                 </a:r>
+                <a:endParaRPr lang="it-IT" sz="1400" dirty="0" smtClean="0"/>
               </a:p>
             </p:txBody>
           </p:sp>
         </p:grpSp>
-        <p:sp>
-          <p:nvSpPr>
-            <p:cNvPr id="269" name="Oval 32"/>
-            <p:cNvSpPr/>
-            <p:nvPr/>
-          </p:nvSpPr>
-          <p:spPr>
-            <a:xfrm>
-              <a:off x="8050118" y="2307346"/>
-              <a:ext cx="129329" cy="129600"/>
-            </a:xfrm>
-            <a:prstGeom prst="ellipse">
-              <a:avLst/>
-            </a:prstGeom>
-          </p:spPr>
-          <p:style>
-            <a:lnRef idx="1">
-              <a:schemeClr val="dk1"/>
-            </a:lnRef>
-            <a:fillRef idx="3">
-              <a:schemeClr val="dk1"/>
-            </a:fillRef>
-            <a:effectRef idx="2">
-              <a:schemeClr val="dk1"/>
-            </a:effectRef>
-            <a:fontRef idx="minor">
-              <a:schemeClr val="lt1"/>
-            </a:fontRef>
-          </p:style>
-          <p:txBody>
-            <a:bodyPr rtlCol="0" anchor="ctr" anchorCtr="0"/>
-            <a:lstStyle>
-              <a:defPPr>
-                <a:defRPr lang="it-IT"/>
-              </a:defPPr>
-              <a:lvl1pPr marL="0" algn="l" defTabSz="457200" rtl="0" eaLnBrk="1" latinLnBrk="0" hangingPunct="1">
-                <a:defRPr sz="1800" kern="1200">
-                  <a:solidFill>
-                    <a:schemeClr val="lt1"/>
-                  </a:solidFill>
-                  <a:latin typeface="+mn-lt"/>
-                  <a:ea typeface="+mn-ea"/>
-                  <a:cs typeface="+mn-cs"/>
-                </a:defRPr>
-              </a:lvl1pPr>
-              <a:lvl2pPr marL="457200" algn="l" defTabSz="457200" rtl="0" eaLnBrk="1" latinLnBrk="0" hangingPunct="1">
-                <a:defRPr sz="1800" kern="1200">
-                  <a:solidFill>
-                    <a:schemeClr val="lt1"/>
-                  </a:solidFill>
-                  <a:latin typeface="+mn-lt"/>
-                  <a:ea typeface="+mn-ea"/>
-                  <a:cs typeface="+mn-cs"/>
-                </a:defRPr>
-              </a:lvl2pPr>
-              <a:lvl3pPr marL="914400" algn="l" defTabSz="457200" rtl="0" eaLnBrk="1" latinLnBrk="0" hangingPunct="1">
-                <a:defRPr sz="1800" kern="1200">
-                  <a:solidFill>
-                    <a:schemeClr val="lt1"/>
-                  </a:solidFill>
-                  <a:latin typeface="+mn-lt"/>
-                  <a:ea typeface="+mn-ea"/>
-                  <a:cs typeface="+mn-cs"/>
-                </a:defRPr>
-              </a:lvl3pPr>
-              <a:lvl4pPr marL="1371600" algn="l" defTabSz="457200" rtl="0" eaLnBrk="1" latinLnBrk="0" hangingPunct="1">
-                <a:defRPr sz="1800" kern="1200">
-                  <a:solidFill>
-                    <a:schemeClr val="lt1"/>
-                  </a:solidFill>
-                  <a:latin typeface="+mn-lt"/>
-                  <a:ea typeface="+mn-ea"/>
-                  <a:cs typeface="+mn-cs"/>
-                </a:defRPr>
-              </a:lvl4pPr>
-              <a:lvl5pPr marL="1828800" algn="l" defTabSz="457200" rtl="0" eaLnBrk="1" latinLnBrk="0" hangingPunct="1">
-                <a:defRPr sz="1800" kern="1200">
-                  <a:solidFill>
-                    <a:schemeClr val="lt1"/>
-                  </a:solidFill>
-                  <a:latin typeface="+mn-lt"/>
-                  <a:ea typeface="+mn-ea"/>
-                  <a:cs typeface="+mn-cs"/>
-                </a:defRPr>
-              </a:lvl5pPr>
-              <a:lvl6pPr marL="2286000" algn="l" defTabSz="457200" rtl="0" eaLnBrk="1" latinLnBrk="0" hangingPunct="1">
-                <a:defRPr sz="1800" kern="1200">
-                  <a:solidFill>
-                    <a:schemeClr val="lt1"/>
-                  </a:solidFill>
-                  <a:latin typeface="+mn-lt"/>
-                  <a:ea typeface="+mn-ea"/>
-                  <a:cs typeface="+mn-cs"/>
-                </a:defRPr>
-              </a:lvl6pPr>
-              <a:lvl7pPr marL="2743200" algn="l" defTabSz="457200" rtl="0" eaLnBrk="1" latinLnBrk="0" hangingPunct="1">
-                <a:defRPr sz="1800" kern="1200">
-                  <a:solidFill>
-                    <a:schemeClr val="lt1"/>
-                  </a:solidFill>
-                  <a:latin typeface="+mn-lt"/>
-                  <a:ea typeface="+mn-ea"/>
-                  <a:cs typeface="+mn-cs"/>
-                </a:defRPr>
-              </a:lvl7pPr>
-              <a:lvl8pPr marL="3200400" algn="l" defTabSz="457200" rtl="0" eaLnBrk="1" latinLnBrk="0" hangingPunct="1">
-                <a:defRPr sz="1800" kern="1200">
-                  <a:solidFill>
-                    <a:schemeClr val="lt1"/>
-                  </a:solidFill>
-                  <a:latin typeface="+mn-lt"/>
-                  <a:ea typeface="+mn-ea"/>
-                  <a:cs typeface="+mn-cs"/>
-                </a:defRPr>
-              </a:lvl8pPr>
-              <a:lvl9pPr marL="3657600" algn="l" defTabSz="457200" rtl="0" eaLnBrk="1" latinLnBrk="0" hangingPunct="1">
-                <a:defRPr sz="1800" kern="1200">
-                  <a:solidFill>
-                    <a:schemeClr val="lt1"/>
-                  </a:solidFill>
-                  <a:latin typeface="+mn-lt"/>
-                  <a:ea typeface="+mn-ea"/>
-                  <a:cs typeface="+mn-cs"/>
-                </a:defRPr>
-              </a:lvl9pPr>
-            </a:lstStyle>
-            <a:p>
-              <a:pPr algn="ctr"/>
-              <a:endParaRPr lang="it-IT"/>
-            </a:p>
-          </p:txBody>
-        </p:sp>
-        <p:sp>
-          <p:nvSpPr>
-            <p:cNvPr id="270" name="Oval 32"/>
-            <p:cNvSpPr/>
-            <p:nvPr/>
-          </p:nvSpPr>
-          <p:spPr>
-            <a:xfrm>
-              <a:off x="8050118" y="2091455"/>
-              <a:ext cx="129329" cy="129600"/>
-            </a:xfrm>
-            <a:prstGeom prst="ellipse">
-              <a:avLst/>
-            </a:prstGeom>
-          </p:spPr>
-          <p:style>
-            <a:lnRef idx="1">
-              <a:schemeClr val="dk1"/>
-            </a:lnRef>
-            <a:fillRef idx="3">
-              <a:schemeClr val="dk1"/>
-            </a:fillRef>
-            <a:effectRef idx="2">
-              <a:schemeClr val="dk1"/>
-            </a:effectRef>
-            <a:fontRef idx="minor">
-              <a:schemeClr val="lt1"/>
-            </a:fontRef>
-          </p:style>
-          <p:txBody>
-            <a:bodyPr rtlCol="0" anchor="ctr" anchorCtr="0"/>
-            <a:lstStyle>
-              <a:defPPr>
-                <a:defRPr lang="it-IT"/>
-              </a:defPPr>
-              <a:lvl1pPr marL="0" algn="l" defTabSz="457200" rtl="0" eaLnBrk="1" latinLnBrk="0" hangingPunct="1">
-                <a:defRPr sz="1800" kern="1200">
-                  <a:solidFill>
-                    <a:schemeClr val="lt1"/>
-                  </a:solidFill>
-                  <a:latin typeface="+mn-lt"/>
-                  <a:ea typeface="+mn-ea"/>
-                  <a:cs typeface="+mn-cs"/>
-                </a:defRPr>
-              </a:lvl1pPr>
-              <a:lvl2pPr marL="457200" algn="l" defTabSz="457200" rtl="0" eaLnBrk="1" latinLnBrk="0" hangingPunct="1">
-                <a:defRPr sz="1800" kern="1200">
-                  <a:solidFill>
-                    <a:schemeClr val="lt1"/>
-                  </a:solidFill>
-                  <a:latin typeface="+mn-lt"/>
-                  <a:ea typeface="+mn-ea"/>
-                  <a:cs typeface="+mn-cs"/>
-                </a:defRPr>
-              </a:lvl2pPr>
-              <a:lvl3pPr marL="914400" algn="l" defTabSz="457200" rtl="0" eaLnBrk="1" latinLnBrk="0" hangingPunct="1">
-                <a:defRPr sz="1800" kern="1200">
-                  <a:solidFill>
-                    <a:schemeClr val="lt1"/>
-                  </a:solidFill>
-                  <a:latin typeface="+mn-lt"/>
-                  <a:ea typeface="+mn-ea"/>
-                  <a:cs typeface="+mn-cs"/>
-                </a:defRPr>
-              </a:lvl3pPr>
-              <a:lvl4pPr marL="1371600" algn="l" defTabSz="457200" rtl="0" eaLnBrk="1" latinLnBrk="0" hangingPunct="1">
-                <a:defRPr sz="1800" kern="1200">
-                  <a:solidFill>
-                    <a:schemeClr val="lt1"/>
-                  </a:solidFill>
-                  <a:latin typeface="+mn-lt"/>
-                  <a:ea typeface="+mn-ea"/>
-                  <a:cs typeface="+mn-cs"/>
-                </a:defRPr>
-              </a:lvl4pPr>
-              <a:lvl5pPr marL="1828800" algn="l" defTabSz="457200" rtl="0" eaLnBrk="1" latinLnBrk="0" hangingPunct="1">
-                <a:defRPr sz="1800" kern="1200">
-                  <a:solidFill>
-                    <a:schemeClr val="lt1"/>
-                  </a:solidFill>
-                  <a:latin typeface="+mn-lt"/>
-                  <a:ea typeface="+mn-ea"/>
-                  <a:cs typeface="+mn-cs"/>
-                </a:defRPr>
-              </a:lvl5pPr>
-              <a:lvl6pPr marL="2286000" algn="l" defTabSz="457200" rtl="0" eaLnBrk="1" latinLnBrk="0" hangingPunct="1">
-                <a:defRPr sz="1800" kern="1200">
-                  <a:solidFill>
-                    <a:schemeClr val="lt1"/>
-                  </a:solidFill>
-                  <a:latin typeface="+mn-lt"/>
-                  <a:ea typeface="+mn-ea"/>
-                  <a:cs typeface="+mn-cs"/>
-                </a:defRPr>
-              </a:lvl6pPr>
-              <a:lvl7pPr marL="2743200" algn="l" defTabSz="457200" rtl="0" eaLnBrk="1" latinLnBrk="0" hangingPunct="1">
-                <a:defRPr sz="1800" kern="1200">
-                  <a:solidFill>
-                    <a:schemeClr val="lt1"/>
-                  </a:solidFill>
-                  <a:latin typeface="+mn-lt"/>
-                  <a:ea typeface="+mn-ea"/>
-                  <a:cs typeface="+mn-cs"/>
-                </a:defRPr>
-              </a:lvl7pPr>
-              <a:lvl8pPr marL="3200400" algn="l" defTabSz="457200" rtl="0" eaLnBrk="1" latinLnBrk="0" hangingPunct="1">
-                <a:defRPr sz="1800" kern="1200">
-                  <a:solidFill>
-                    <a:schemeClr val="lt1"/>
-                  </a:solidFill>
-                  <a:latin typeface="+mn-lt"/>
-                  <a:ea typeface="+mn-ea"/>
-                  <a:cs typeface="+mn-cs"/>
-                </a:defRPr>
-              </a:lvl8pPr>
-              <a:lvl9pPr marL="3657600" algn="l" defTabSz="457200" rtl="0" eaLnBrk="1" latinLnBrk="0" hangingPunct="1">
-                <a:defRPr sz="1800" kern="1200">
-                  <a:solidFill>
-                    <a:schemeClr val="lt1"/>
-                  </a:solidFill>
-                  <a:latin typeface="+mn-lt"/>
-                  <a:ea typeface="+mn-ea"/>
-                  <a:cs typeface="+mn-cs"/>
-                </a:defRPr>
-              </a:lvl9pPr>
-            </a:lstStyle>
-            <a:p>
-              <a:pPr algn="ctr"/>
-              <a:endParaRPr lang="it-IT"/>
-            </a:p>
-          </p:txBody>
-        </p:sp>
-        <p:sp>
-          <p:nvSpPr>
-            <p:cNvPr id="271" name="Oval 32"/>
-            <p:cNvSpPr/>
-            <p:nvPr/>
-          </p:nvSpPr>
-          <p:spPr>
-            <a:xfrm>
-              <a:off x="8050118" y="1875564"/>
-              <a:ext cx="129329" cy="129600"/>
-            </a:xfrm>
-            <a:prstGeom prst="ellipse">
-              <a:avLst/>
-            </a:prstGeom>
-          </p:spPr>
-          <p:style>
-            <a:lnRef idx="1">
-              <a:schemeClr val="dk1"/>
-            </a:lnRef>
-            <a:fillRef idx="3">
-              <a:schemeClr val="dk1"/>
-            </a:fillRef>
-            <a:effectRef idx="2">
-              <a:schemeClr val="dk1"/>
-            </a:effectRef>
-            <a:fontRef idx="minor">
-              <a:schemeClr val="lt1"/>
-            </a:fontRef>
-          </p:style>
-          <p:txBody>
-            <a:bodyPr rtlCol="0" anchor="ctr" anchorCtr="0"/>
-            <a:lstStyle>
-              <a:defPPr>
-                <a:defRPr lang="it-IT"/>
-              </a:defPPr>
-              <a:lvl1pPr marL="0" algn="l" defTabSz="457200" rtl="0" eaLnBrk="1" latinLnBrk="0" hangingPunct="1">
-                <a:defRPr sz="1800" kern="1200">
-                  <a:solidFill>
-                    <a:schemeClr val="lt1"/>
-                  </a:solidFill>
-                  <a:latin typeface="+mn-lt"/>
-                  <a:ea typeface="+mn-ea"/>
-                  <a:cs typeface="+mn-cs"/>
-                </a:defRPr>
-              </a:lvl1pPr>
-              <a:lvl2pPr marL="457200" algn="l" defTabSz="457200" rtl="0" eaLnBrk="1" latinLnBrk="0" hangingPunct="1">
-                <a:defRPr sz="1800" kern="1200">
-                  <a:solidFill>
-                    <a:schemeClr val="lt1"/>
-                  </a:solidFill>
-                  <a:latin typeface="+mn-lt"/>
-                  <a:ea typeface="+mn-ea"/>
-                  <a:cs typeface="+mn-cs"/>
-                </a:defRPr>
-              </a:lvl2pPr>
-              <a:lvl3pPr marL="914400" algn="l" defTabSz="457200" rtl="0" eaLnBrk="1" latinLnBrk="0" hangingPunct="1">
-                <a:defRPr sz="1800" kern="1200">
-                  <a:solidFill>
-                    <a:schemeClr val="lt1"/>
-                  </a:solidFill>
-                  <a:latin typeface="+mn-lt"/>
-                  <a:ea typeface="+mn-ea"/>
-                  <a:cs typeface="+mn-cs"/>
-                </a:defRPr>
-              </a:lvl3pPr>
-              <a:lvl4pPr marL="1371600" algn="l" defTabSz="457200" rtl="0" eaLnBrk="1" latinLnBrk="0" hangingPunct="1">
-                <a:defRPr sz="1800" kern="1200">
-                  <a:solidFill>
-                    <a:schemeClr val="lt1"/>
-                  </a:solidFill>
-                  <a:latin typeface="+mn-lt"/>
-                  <a:ea typeface="+mn-ea"/>
-                  <a:cs typeface="+mn-cs"/>
-                </a:defRPr>
-              </a:lvl4pPr>
-              <a:lvl5pPr marL="1828800" algn="l" defTabSz="457200" rtl="0" eaLnBrk="1" latinLnBrk="0" hangingPunct="1">
-                <a:defRPr sz="1800" kern="1200">
-                  <a:solidFill>
-                    <a:schemeClr val="lt1"/>
-                  </a:solidFill>
-                  <a:latin typeface="+mn-lt"/>
-                  <a:ea typeface="+mn-ea"/>
-                  <a:cs typeface="+mn-cs"/>
-                </a:defRPr>
-              </a:lvl5pPr>
-              <a:lvl6pPr marL="2286000" algn="l" defTabSz="457200" rtl="0" eaLnBrk="1" latinLnBrk="0" hangingPunct="1">
-                <a:defRPr sz="1800" kern="1200">
-                  <a:solidFill>
-                    <a:schemeClr val="lt1"/>
-                  </a:solidFill>
-                  <a:latin typeface="+mn-lt"/>
-                  <a:ea typeface="+mn-ea"/>
-                  <a:cs typeface="+mn-cs"/>
-                </a:defRPr>
-              </a:lvl6pPr>
-              <a:lvl7pPr marL="2743200" algn="l" defTabSz="457200" rtl="0" eaLnBrk="1" latinLnBrk="0" hangingPunct="1">
-                <a:defRPr sz="1800" kern="1200">
-                  <a:solidFill>
-                    <a:schemeClr val="lt1"/>
-                  </a:solidFill>
-                  <a:latin typeface="+mn-lt"/>
-                  <a:ea typeface="+mn-ea"/>
-                  <a:cs typeface="+mn-cs"/>
-                </a:defRPr>
-              </a:lvl7pPr>
-              <a:lvl8pPr marL="3200400" algn="l" defTabSz="457200" rtl="0" eaLnBrk="1" latinLnBrk="0" hangingPunct="1">
-                <a:defRPr sz="1800" kern="1200">
-                  <a:solidFill>
-                    <a:schemeClr val="lt1"/>
-                  </a:solidFill>
-                  <a:latin typeface="+mn-lt"/>
-                  <a:ea typeface="+mn-ea"/>
-                  <a:cs typeface="+mn-cs"/>
-                </a:defRPr>
-              </a:lvl8pPr>
-              <a:lvl9pPr marL="3657600" algn="l" defTabSz="457200" rtl="0" eaLnBrk="1" latinLnBrk="0" hangingPunct="1">
-                <a:defRPr sz="1800" kern="1200">
-                  <a:solidFill>
-                    <a:schemeClr val="lt1"/>
-                  </a:solidFill>
-                  <a:latin typeface="+mn-lt"/>
-                  <a:ea typeface="+mn-ea"/>
-                  <a:cs typeface="+mn-cs"/>
-                </a:defRPr>
-              </a:lvl9pPr>
-            </a:lstStyle>
-            <a:p>
-              <a:pPr algn="ctr"/>
-              <a:endParaRPr lang="it-IT"/>
-            </a:p>
-          </p:txBody>
-        </p:sp>
         <p:sp>
           <p:nvSpPr>
             <p:cNvPr id="10" name="Rettangolo arrotondato 9"/>
@@ -10338,8 +9933,8 @@
           </p:nvSpPr>
           <p:spPr>
             <a:xfrm>
-              <a:off x="1695701" y="4396135"/>
-              <a:ext cx="1688075" cy="216107"/>
+              <a:off x="1695701" y="4242579"/>
+              <a:ext cx="1688075" cy="523220"/>
             </a:xfrm>
             <a:prstGeom prst="rect">
               <a:avLst/>
@@ -10452,6 +10047,13 @@
               </a:r>
               <a:endParaRPr lang="it-IT" sz="1400" u="sng" dirty="0" smtClean="0"/>
             </a:p>
+            <a:p>
+              <a:r>
+                <a:rPr lang="it-IT" sz="1400" dirty="0" smtClean="0"/>
+                <a:t>FAQ</a:t>
+              </a:r>
+              <a:endParaRPr lang="it-IT" sz="1400" dirty="0" smtClean="0"/>
+            </a:p>
           </p:txBody>
         </p:sp>
         <p:sp>
@@ -10507,138 +10109,6 @@
                   </a:outerShdw>
                 </a:effectLst>
               </a:endParaRPr>
-            </a:p>
-          </p:txBody>
-        </p:sp>
-        <p:sp>
-          <p:nvSpPr>
-            <p:cNvPr id="296" name="Oval 32"/>
-            <p:cNvSpPr/>
-            <p:nvPr/>
-          </p:nvSpPr>
-          <p:spPr>
-            <a:xfrm>
-              <a:off x="1595311" y="4439388"/>
-              <a:ext cx="129600" cy="129600"/>
-            </a:xfrm>
-            <a:prstGeom prst="ellipse">
-              <a:avLst/>
-            </a:prstGeom>
-          </p:spPr>
-          <p:style>
-            <a:lnRef idx="1">
-              <a:schemeClr val="dk1"/>
-            </a:lnRef>
-            <a:fillRef idx="3">
-              <a:schemeClr val="dk1"/>
-            </a:fillRef>
-            <a:effectRef idx="2">
-              <a:schemeClr val="dk1"/>
-            </a:effectRef>
-            <a:fontRef idx="minor">
-              <a:schemeClr val="lt1"/>
-            </a:fontRef>
-          </p:style>
-          <p:txBody>
-            <a:bodyPr rtlCol="0" anchor="ctr" anchorCtr="0"/>
-            <a:lstStyle>
-              <a:defPPr>
-                <a:defRPr lang="it-IT"/>
-              </a:defPPr>
-              <a:lvl1pPr marL="0" algn="l" defTabSz="457200" rtl="0" eaLnBrk="1" latinLnBrk="0" hangingPunct="1">
-                <a:defRPr sz="1800" kern="1200">
-                  <a:solidFill>
-                    <a:schemeClr val="lt1"/>
-                  </a:solidFill>
-                  <a:latin typeface="+mn-lt"/>
-                  <a:ea typeface="+mn-ea"/>
-                  <a:cs typeface="+mn-cs"/>
-                </a:defRPr>
-              </a:lvl1pPr>
-              <a:lvl2pPr marL="457200" algn="l" defTabSz="457200" rtl="0" eaLnBrk="1" latinLnBrk="0" hangingPunct="1">
-                <a:defRPr sz="1800" kern="1200">
-                  <a:solidFill>
-                    <a:schemeClr val="lt1"/>
-                  </a:solidFill>
-                  <a:latin typeface="+mn-lt"/>
-                  <a:ea typeface="+mn-ea"/>
-                  <a:cs typeface="+mn-cs"/>
-                </a:defRPr>
-              </a:lvl2pPr>
-              <a:lvl3pPr marL="914400" algn="l" defTabSz="457200" rtl="0" eaLnBrk="1" latinLnBrk="0" hangingPunct="1">
-                <a:defRPr sz="1800" kern="1200">
-                  <a:solidFill>
-                    <a:schemeClr val="lt1"/>
-                  </a:solidFill>
-                  <a:latin typeface="+mn-lt"/>
-                  <a:ea typeface="+mn-ea"/>
-                  <a:cs typeface="+mn-cs"/>
-                </a:defRPr>
-              </a:lvl3pPr>
-              <a:lvl4pPr marL="1371600" algn="l" defTabSz="457200" rtl="0" eaLnBrk="1" latinLnBrk="0" hangingPunct="1">
-                <a:defRPr sz="1800" kern="1200">
-                  <a:solidFill>
-                    <a:schemeClr val="lt1"/>
-                  </a:solidFill>
-                  <a:latin typeface="+mn-lt"/>
-                  <a:ea typeface="+mn-ea"/>
-                  <a:cs typeface="+mn-cs"/>
-                </a:defRPr>
-              </a:lvl4pPr>
-              <a:lvl5pPr marL="1828800" algn="l" defTabSz="457200" rtl="0" eaLnBrk="1" latinLnBrk="0" hangingPunct="1">
-                <a:defRPr sz="1800" kern="1200">
-                  <a:solidFill>
-                    <a:schemeClr val="lt1"/>
-                  </a:solidFill>
-                  <a:latin typeface="+mn-lt"/>
-                  <a:ea typeface="+mn-ea"/>
-                  <a:cs typeface="+mn-cs"/>
-                </a:defRPr>
-              </a:lvl5pPr>
-              <a:lvl6pPr marL="2286000" algn="l" defTabSz="457200" rtl="0" eaLnBrk="1" latinLnBrk="0" hangingPunct="1">
-                <a:defRPr sz="1800" kern="1200">
-                  <a:solidFill>
-                    <a:schemeClr val="lt1"/>
-                  </a:solidFill>
-                  <a:latin typeface="+mn-lt"/>
-                  <a:ea typeface="+mn-ea"/>
-                  <a:cs typeface="+mn-cs"/>
-                </a:defRPr>
-              </a:lvl6pPr>
-              <a:lvl7pPr marL="2743200" algn="l" defTabSz="457200" rtl="0" eaLnBrk="1" latinLnBrk="0" hangingPunct="1">
-                <a:defRPr sz="1800" kern="1200">
-                  <a:solidFill>
-                    <a:schemeClr val="lt1"/>
-                  </a:solidFill>
-                  <a:latin typeface="+mn-lt"/>
-                  <a:ea typeface="+mn-ea"/>
-                  <a:cs typeface="+mn-cs"/>
-                </a:defRPr>
-              </a:lvl7pPr>
-              <a:lvl8pPr marL="3200400" algn="l" defTabSz="457200" rtl="0" eaLnBrk="1" latinLnBrk="0" hangingPunct="1">
-                <a:defRPr sz="1800" kern="1200">
-                  <a:solidFill>
-                    <a:schemeClr val="lt1"/>
-                  </a:solidFill>
-                  <a:latin typeface="+mn-lt"/>
-                  <a:ea typeface="+mn-ea"/>
-                  <a:cs typeface="+mn-cs"/>
-                </a:defRPr>
-              </a:lvl8pPr>
-              <a:lvl9pPr marL="3657600" algn="l" defTabSz="457200" rtl="0" eaLnBrk="1" latinLnBrk="0" hangingPunct="1">
-                <a:defRPr sz="1800" kern="1200">
-                  <a:solidFill>
-                    <a:schemeClr val="lt1"/>
-                  </a:solidFill>
-                  <a:latin typeface="+mn-lt"/>
-                  <a:ea typeface="+mn-ea"/>
-                  <a:cs typeface="+mn-cs"/>
-                </a:defRPr>
-              </a:lvl9pPr>
-            </a:lstStyle>
-            <a:p>
-              <a:pPr algn="ctr"/>
-              <a:endParaRPr lang="it-IT"/>
             </a:p>
           </p:txBody>
         </p:sp>
@@ -16792,8 +16262,536 @@
         </p:nvSpPr>
         <p:spPr>
           <a:xfrm>
-            <a:off x="8965759" y="1807997"/>
+            <a:off x="8991007" y="1643216"/>
             <a:ext cx="129329" cy="129600"/>
+          </a:xfrm>
+          <a:prstGeom prst="ellipse">
+            <a:avLst/>
+          </a:prstGeom>
+        </p:spPr>
+        <p:style>
+          <a:lnRef idx="1">
+            <a:schemeClr val="dk1"/>
+          </a:lnRef>
+          <a:fillRef idx="3">
+            <a:schemeClr val="dk1"/>
+          </a:fillRef>
+          <a:effectRef idx="2">
+            <a:schemeClr val="dk1"/>
+          </a:effectRef>
+          <a:fontRef idx="minor">
+            <a:schemeClr val="lt1"/>
+          </a:fontRef>
+        </p:style>
+        <p:txBody>
+          <a:bodyPr rtlCol="0" anchor="ctr" anchorCtr="0"/>
+          <a:lstStyle>
+            <a:defPPr>
+              <a:defRPr lang="it-IT"/>
+            </a:defPPr>
+            <a:lvl1pPr marL="0" algn="l" defTabSz="457200" rtl="0" eaLnBrk="1" latinLnBrk="0" hangingPunct="1">
+              <a:defRPr sz="1800" kern="1200">
+                <a:solidFill>
+                  <a:schemeClr val="lt1"/>
+                </a:solidFill>
+                <a:latin typeface="+mn-lt"/>
+                <a:ea typeface="+mn-ea"/>
+                <a:cs typeface="+mn-cs"/>
+              </a:defRPr>
+            </a:lvl1pPr>
+            <a:lvl2pPr marL="457200" algn="l" defTabSz="457200" rtl="0" eaLnBrk="1" latinLnBrk="0" hangingPunct="1">
+              <a:defRPr sz="1800" kern="1200">
+                <a:solidFill>
+                  <a:schemeClr val="lt1"/>
+                </a:solidFill>
+                <a:latin typeface="+mn-lt"/>
+                <a:ea typeface="+mn-ea"/>
+                <a:cs typeface="+mn-cs"/>
+              </a:defRPr>
+            </a:lvl2pPr>
+            <a:lvl3pPr marL="914400" algn="l" defTabSz="457200" rtl="0" eaLnBrk="1" latinLnBrk="0" hangingPunct="1">
+              <a:defRPr sz="1800" kern="1200">
+                <a:solidFill>
+                  <a:schemeClr val="lt1"/>
+                </a:solidFill>
+                <a:latin typeface="+mn-lt"/>
+                <a:ea typeface="+mn-ea"/>
+                <a:cs typeface="+mn-cs"/>
+              </a:defRPr>
+            </a:lvl3pPr>
+            <a:lvl4pPr marL="1371600" algn="l" defTabSz="457200" rtl="0" eaLnBrk="1" latinLnBrk="0" hangingPunct="1">
+              <a:defRPr sz="1800" kern="1200">
+                <a:solidFill>
+                  <a:schemeClr val="lt1"/>
+                </a:solidFill>
+                <a:latin typeface="+mn-lt"/>
+                <a:ea typeface="+mn-ea"/>
+                <a:cs typeface="+mn-cs"/>
+              </a:defRPr>
+            </a:lvl4pPr>
+            <a:lvl5pPr marL="1828800" algn="l" defTabSz="457200" rtl="0" eaLnBrk="1" latinLnBrk="0" hangingPunct="1">
+              <a:defRPr sz="1800" kern="1200">
+                <a:solidFill>
+                  <a:schemeClr val="lt1"/>
+                </a:solidFill>
+                <a:latin typeface="+mn-lt"/>
+                <a:ea typeface="+mn-ea"/>
+                <a:cs typeface="+mn-cs"/>
+              </a:defRPr>
+            </a:lvl5pPr>
+            <a:lvl6pPr marL="2286000" algn="l" defTabSz="457200" rtl="0" eaLnBrk="1" latinLnBrk="0" hangingPunct="1">
+              <a:defRPr sz="1800" kern="1200">
+                <a:solidFill>
+                  <a:schemeClr val="lt1"/>
+                </a:solidFill>
+                <a:latin typeface="+mn-lt"/>
+                <a:ea typeface="+mn-ea"/>
+                <a:cs typeface="+mn-cs"/>
+              </a:defRPr>
+            </a:lvl6pPr>
+            <a:lvl7pPr marL="2743200" algn="l" defTabSz="457200" rtl="0" eaLnBrk="1" latinLnBrk="0" hangingPunct="1">
+              <a:defRPr sz="1800" kern="1200">
+                <a:solidFill>
+                  <a:schemeClr val="lt1"/>
+                </a:solidFill>
+                <a:latin typeface="+mn-lt"/>
+                <a:ea typeface="+mn-ea"/>
+                <a:cs typeface="+mn-cs"/>
+              </a:defRPr>
+            </a:lvl7pPr>
+            <a:lvl8pPr marL="3200400" algn="l" defTabSz="457200" rtl="0" eaLnBrk="1" latinLnBrk="0" hangingPunct="1">
+              <a:defRPr sz="1800" kern="1200">
+                <a:solidFill>
+                  <a:schemeClr val="lt1"/>
+                </a:solidFill>
+                <a:latin typeface="+mn-lt"/>
+                <a:ea typeface="+mn-ea"/>
+                <a:cs typeface="+mn-cs"/>
+              </a:defRPr>
+            </a:lvl8pPr>
+            <a:lvl9pPr marL="3657600" algn="l" defTabSz="457200" rtl="0" eaLnBrk="1" latinLnBrk="0" hangingPunct="1">
+              <a:defRPr sz="1800" kern="1200">
+                <a:solidFill>
+                  <a:schemeClr val="lt1"/>
+                </a:solidFill>
+                <a:latin typeface="+mn-lt"/>
+                <a:ea typeface="+mn-ea"/>
+                <a:cs typeface="+mn-cs"/>
+              </a:defRPr>
+            </a:lvl9pPr>
+          </a:lstStyle>
+          <a:p>
+            <a:pPr algn="ctr"/>
+            <a:endParaRPr lang="it-IT" dirty="0"/>
+          </a:p>
+        </p:txBody>
+      </p:sp>
+      <p:sp>
+        <p:nvSpPr>
+          <p:cNvPr id="223" name="Oval 32"/>
+          <p:cNvSpPr/>
+          <p:nvPr/>
+        </p:nvSpPr>
+        <p:spPr>
+          <a:xfrm>
+            <a:off x="8990736" y="1220755"/>
+            <a:ext cx="129600" cy="129600"/>
+          </a:xfrm>
+          <a:prstGeom prst="ellipse">
+            <a:avLst/>
+          </a:prstGeom>
+        </p:spPr>
+        <p:style>
+          <a:lnRef idx="1">
+            <a:schemeClr val="dk1"/>
+          </a:lnRef>
+          <a:fillRef idx="3">
+            <a:schemeClr val="dk1"/>
+          </a:fillRef>
+          <a:effectRef idx="2">
+            <a:schemeClr val="dk1"/>
+          </a:effectRef>
+          <a:fontRef idx="minor">
+            <a:schemeClr val="lt1"/>
+          </a:fontRef>
+        </p:style>
+        <p:txBody>
+          <a:bodyPr rtlCol="0" anchor="ctr" anchorCtr="0"/>
+          <a:lstStyle>
+            <a:defPPr>
+              <a:defRPr lang="it-IT"/>
+            </a:defPPr>
+            <a:lvl1pPr marL="0" algn="l" defTabSz="457200" rtl="0" eaLnBrk="1" latinLnBrk="0" hangingPunct="1">
+              <a:defRPr sz="1800" kern="1200">
+                <a:solidFill>
+                  <a:schemeClr val="lt1"/>
+                </a:solidFill>
+                <a:latin typeface="+mn-lt"/>
+                <a:ea typeface="+mn-ea"/>
+                <a:cs typeface="+mn-cs"/>
+              </a:defRPr>
+            </a:lvl1pPr>
+            <a:lvl2pPr marL="457200" algn="l" defTabSz="457200" rtl="0" eaLnBrk="1" latinLnBrk="0" hangingPunct="1">
+              <a:defRPr sz="1800" kern="1200">
+                <a:solidFill>
+                  <a:schemeClr val="lt1"/>
+                </a:solidFill>
+                <a:latin typeface="+mn-lt"/>
+                <a:ea typeface="+mn-ea"/>
+                <a:cs typeface="+mn-cs"/>
+              </a:defRPr>
+            </a:lvl2pPr>
+            <a:lvl3pPr marL="914400" algn="l" defTabSz="457200" rtl="0" eaLnBrk="1" latinLnBrk="0" hangingPunct="1">
+              <a:defRPr sz="1800" kern="1200">
+                <a:solidFill>
+                  <a:schemeClr val="lt1"/>
+                </a:solidFill>
+                <a:latin typeface="+mn-lt"/>
+                <a:ea typeface="+mn-ea"/>
+                <a:cs typeface="+mn-cs"/>
+              </a:defRPr>
+            </a:lvl3pPr>
+            <a:lvl4pPr marL="1371600" algn="l" defTabSz="457200" rtl="0" eaLnBrk="1" latinLnBrk="0" hangingPunct="1">
+              <a:defRPr sz="1800" kern="1200">
+                <a:solidFill>
+                  <a:schemeClr val="lt1"/>
+                </a:solidFill>
+                <a:latin typeface="+mn-lt"/>
+                <a:ea typeface="+mn-ea"/>
+                <a:cs typeface="+mn-cs"/>
+              </a:defRPr>
+            </a:lvl4pPr>
+            <a:lvl5pPr marL="1828800" algn="l" defTabSz="457200" rtl="0" eaLnBrk="1" latinLnBrk="0" hangingPunct="1">
+              <a:defRPr sz="1800" kern="1200">
+                <a:solidFill>
+                  <a:schemeClr val="lt1"/>
+                </a:solidFill>
+                <a:latin typeface="+mn-lt"/>
+                <a:ea typeface="+mn-ea"/>
+                <a:cs typeface="+mn-cs"/>
+              </a:defRPr>
+            </a:lvl5pPr>
+            <a:lvl6pPr marL="2286000" algn="l" defTabSz="457200" rtl="0" eaLnBrk="1" latinLnBrk="0" hangingPunct="1">
+              <a:defRPr sz="1800" kern="1200">
+                <a:solidFill>
+                  <a:schemeClr val="lt1"/>
+                </a:solidFill>
+                <a:latin typeface="+mn-lt"/>
+                <a:ea typeface="+mn-ea"/>
+                <a:cs typeface="+mn-cs"/>
+              </a:defRPr>
+            </a:lvl6pPr>
+            <a:lvl7pPr marL="2743200" algn="l" defTabSz="457200" rtl="0" eaLnBrk="1" latinLnBrk="0" hangingPunct="1">
+              <a:defRPr sz="1800" kern="1200">
+                <a:solidFill>
+                  <a:schemeClr val="lt1"/>
+                </a:solidFill>
+                <a:latin typeface="+mn-lt"/>
+                <a:ea typeface="+mn-ea"/>
+                <a:cs typeface="+mn-cs"/>
+              </a:defRPr>
+            </a:lvl7pPr>
+            <a:lvl8pPr marL="3200400" algn="l" defTabSz="457200" rtl="0" eaLnBrk="1" latinLnBrk="0" hangingPunct="1">
+              <a:defRPr sz="1800" kern="1200">
+                <a:solidFill>
+                  <a:schemeClr val="lt1"/>
+                </a:solidFill>
+                <a:latin typeface="+mn-lt"/>
+                <a:ea typeface="+mn-ea"/>
+                <a:cs typeface="+mn-cs"/>
+              </a:defRPr>
+            </a:lvl8pPr>
+            <a:lvl9pPr marL="3657600" algn="l" defTabSz="457200" rtl="0" eaLnBrk="1" latinLnBrk="0" hangingPunct="1">
+              <a:defRPr sz="1800" kern="1200">
+                <a:solidFill>
+                  <a:schemeClr val="lt1"/>
+                </a:solidFill>
+                <a:latin typeface="+mn-lt"/>
+                <a:ea typeface="+mn-ea"/>
+                <a:cs typeface="+mn-cs"/>
+              </a:defRPr>
+            </a:lvl9pPr>
+          </a:lstStyle>
+          <a:p>
+            <a:pPr algn="ctr"/>
+            <a:endParaRPr lang="it-IT"/>
+          </a:p>
+        </p:txBody>
+      </p:sp>
+      <p:sp>
+        <p:nvSpPr>
+          <p:cNvPr id="224" name="Oval 32"/>
+          <p:cNvSpPr/>
+          <p:nvPr/>
+        </p:nvSpPr>
+        <p:spPr>
+          <a:xfrm>
+            <a:off x="8988435" y="1427192"/>
+            <a:ext cx="129600" cy="129600"/>
+          </a:xfrm>
+          <a:prstGeom prst="ellipse">
+            <a:avLst/>
+          </a:prstGeom>
+        </p:spPr>
+        <p:style>
+          <a:lnRef idx="1">
+            <a:schemeClr val="dk1"/>
+          </a:lnRef>
+          <a:fillRef idx="3">
+            <a:schemeClr val="dk1"/>
+          </a:fillRef>
+          <a:effectRef idx="2">
+            <a:schemeClr val="dk1"/>
+          </a:effectRef>
+          <a:fontRef idx="minor">
+            <a:schemeClr val="lt1"/>
+          </a:fontRef>
+        </p:style>
+        <p:txBody>
+          <a:bodyPr rtlCol="0" anchor="ctr" anchorCtr="0"/>
+          <a:lstStyle>
+            <a:defPPr>
+              <a:defRPr lang="it-IT"/>
+            </a:defPPr>
+            <a:lvl1pPr marL="0" algn="l" defTabSz="457200" rtl="0" eaLnBrk="1" latinLnBrk="0" hangingPunct="1">
+              <a:defRPr sz="1800" kern="1200">
+                <a:solidFill>
+                  <a:schemeClr val="lt1"/>
+                </a:solidFill>
+                <a:latin typeface="+mn-lt"/>
+                <a:ea typeface="+mn-ea"/>
+                <a:cs typeface="+mn-cs"/>
+              </a:defRPr>
+            </a:lvl1pPr>
+            <a:lvl2pPr marL="457200" algn="l" defTabSz="457200" rtl="0" eaLnBrk="1" latinLnBrk="0" hangingPunct="1">
+              <a:defRPr sz="1800" kern="1200">
+                <a:solidFill>
+                  <a:schemeClr val="lt1"/>
+                </a:solidFill>
+                <a:latin typeface="+mn-lt"/>
+                <a:ea typeface="+mn-ea"/>
+                <a:cs typeface="+mn-cs"/>
+              </a:defRPr>
+            </a:lvl2pPr>
+            <a:lvl3pPr marL="914400" algn="l" defTabSz="457200" rtl="0" eaLnBrk="1" latinLnBrk="0" hangingPunct="1">
+              <a:defRPr sz="1800" kern="1200">
+                <a:solidFill>
+                  <a:schemeClr val="lt1"/>
+                </a:solidFill>
+                <a:latin typeface="+mn-lt"/>
+                <a:ea typeface="+mn-ea"/>
+                <a:cs typeface="+mn-cs"/>
+              </a:defRPr>
+            </a:lvl3pPr>
+            <a:lvl4pPr marL="1371600" algn="l" defTabSz="457200" rtl="0" eaLnBrk="1" latinLnBrk="0" hangingPunct="1">
+              <a:defRPr sz="1800" kern="1200">
+                <a:solidFill>
+                  <a:schemeClr val="lt1"/>
+                </a:solidFill>
+                <a:latin typeface="+mn-lt"/>
+                <a:ea typeface="+mn-ea"/>
+                <a:cs typeface="+mn-cs"/>
+              </a:defRPr>
+            </a:lvl4pPr>
+            <a:lvl5pPr marL="1828800" algn="l" defTabSz="457200" rtl="0" eaLnBrk="1" latinLnBrk="0" hangingPunct="1">
+              <a:defRPr sz="1800" kern="1200">
+                <a:solidFill>
+                  <a:schemeClr val="lt1"/>
+                </a:solidFill>
+                <a:latin typeface="+mn-lt"/>
+                <a:ea typeface="+mn-ea"/>
+                <a:cs typeface="+mn-cs"/>
+              </a:defRPr>
+            </a:lvl5pPr>
+            <a:lvl6pPr marL="2286000" algn="l" defTabSz="457200" rtl="0" eaLnBrk="1" latinLnBrk="0" hangingPunct="1">
+              <a:defRPr sz="1800" kern="1200">
+                <a:solidFill>
+                  <a:schemeClr val="lt1"/>
+                </a:solidFill>
+                <a:latin typeface="+mn-lt"/>
+                <a:ea typeface="+mn-ea"/>
+                <a:cs typeface="+mn-cs"/>
+              </a:defRPr>
+            </a:lvl6pPr>
+            <a:lvl7pPr marL="2743200" algn="l" defTabSz="457200" rtl="0" eaLnBrk="1" latinLnBrk="0" hangingPunct="1">
+              <a:defRPr sz="1800" kern="1200">
+                <a:solidFill>
+                  <a:schemeClr val="lt1"/>
+                </a:solidFill>
+                <a:latin typeface="+mn-lt"/>
+                <a:ea typeface="+mn-ea"/>
+                <a:cs typeface="+mn-cs"/>
+              </a:defRPr>
+            </a:lvl7pPr>
+            <a:lvl8pPr marL="3200400" algn="l" defTabSz="457200" rtl="0" eaLnBrk="1" latinLnBrk="0" hangingPunct="1">
+              <a:defRPr sz="1800" kern="1200">
+                <a:solidFill>
+                  <a:schemeClr val="lt1"/>
+                </a:solidFill>
+                <a:latin typeface="+mn-lt"/>
+                <a:ea typeface="+mn-ea"/>
+                <a:cs typeface="+mn-cs"/>
+              </a:defRPr>
+            </a:lvl8pPr>
+            <a:lvl9pPr marL="3657600" algn="l" defTabSz="457200" rtl="0" eaLnBrk="1" latinLnBrk="0" hangingPunct="1">
+              <a:defRPr sz="1800" kern="1200">
+                <a:solidFill>
+                  <a:schemeClr val="lt1"/>
+                </a:solidFill>
+                <a:latin typeface="+mn-lt"/>
+                <a:ea typeface="+mn-ea"/>
+                <a:cs typeface="+mn-cs"/>
+              </a:defRPr>
+            </a:lvl9pPr>
+          </a:lstStyle>
+          <a:p>
+            <a:pPr algn="ctr"/>
+            <a:endParaRPr lang="it-IT"/>
+          </a:p>
+        </p:txBody>
+      </p:sp>
+      <p:sp>
+        <p:nvSpPr>
+          <p:cNvPr id="225" name="Oval 32"/>
+          <p:cNvSpPr/>
+          <p:nvPr/>
+        </p:nvSpPr>
+        <p:spPr>
+          <a:xfrm>
+            <a:off x="2497901" y="4317099"/>
+            <a:ext cx="129600" cy="129600"/>
+          </a:xfrm>
+          <a:prstGeom prst="ellipse">
+            <a:avLst/>
+          </a:prstGeom>
+        </p:spPr>
+        <p:style>
+          <a:lnRef idx="1">
+            <a:schemeClr val="dk1"/>
+          </a:lnRef>
+          <a:fillRef idx="3">
+            <a:schemeClr val="dk1"/>
+          </a:fillRef>
+          <a:effectRef idx="2">
+            <a:schemeClr val="dk1"/>
+          </a:effectRef>
+          <a:fontRef idx="minor">
+            <a:schemeClr val="lt1"/>
+          </a:fontRef>
+        </p:style>
+        <p:txBody>
+          <a:bodyPr rtlCol="0" anchor="ctr" anchorCtr="0"/>
+          <a:lstStyle>
+            <a:defPPr>
+              <a:defRPr lang="it-IT"/>
+            </a:defPPr>
+            <a:lvl1pPr marL="0" algn="l" defTabSz="457200" rtl="0" eaLnBrk="1" latinLnBrk="0" hangingPunct="1">
+              <a:defRPr sz="1800" kern="1200">
+                <a:solidFill>
+                  <a:schemeClr val="lt1"/>
+                </a:solidFill>
+                <a:latin typeface="+mn-lt"/>
+                <a:ea typeface="+mn-ea"/>
+                <a:cs typeface="+mn-cs"/>
+              </a:defRPr>
+            </a:lvl1pPr>
+            <a:lvl2pPr marL="457200" algn="l" defTabSz="457200" rtl="0" eaLnBrk="1" latinLnBrk="0" hangingPunct="1">
+              <a:defRPr sz="1800" kern="1200">
+                <a:solidFill>
+                  <a:schemeClr val="lt1"/>
+                </a:solidFill>
+                <a:latin typeface="+mn-lt"/>
+                <a:ea typeface="+mn-ea"/>
+                <a:cs typeface="+mn-cs"/>
+              </a:defRPr>
+            </a:lvl2pPr>
+            <a:lvl3pPr marL="914400" algn="l" defTabSz="457200" rtl="0" eaLnBrk="1" latinLnBrk="0" hangingPunct="1">
+              <a:defRPr sz="1800" kern="1200">
+                <a:solidFill>
+                  <a:schemeClr val="lt1"/>
+                </a:solidFill>
+                <a:latin typeface="+mn-lt"/>
+                <a:ea typeface="+mn-ea"/>
+                <a:cs typeface="+mn-cs"/>
+              </a:defRPr>
+            </a:lvl3pPr>
+            <a:lvl4pPr marL="1371600" algn="l" defTabSz="457200" rtl="0" eaLnBrk="1" latinLnBrk="0" hangingPunct="1">
+              <a:defRPr sz="1800" kern="1200">
+                <a:solidFill>
+                  <a:schemeClr val="lt1"/>
+                </a:solidFill>
+                <a:latin typeface="+mn-lt"/>
+                <a:ea typeface="+mn-ea"/>
+                <a:cs typeface="+mn-cs"/>
+              </a:defRPr>
+            </a:lvl4pPr>
+            <a:lvl5pPr marL="1828800" algn="l" defTabSz="457200" rtl="0" eaLnBrk="1" latinLnBrk="0" hangingPunct="1">
+              <a:defRPr sz="1800" kern="1200">
+                <a:solidFill>
+                  <a:schemeClr val="lt1"/>
+                </a:solidFill>
+                <a:latin typeface="+mn-lt"/>
+                <a:ea typeface="+mn-ea"/>
+                <a:cs typeface="+mn-cs"/>
+              </a:defRPr>
+            </a:lvl5pPr>
+            <a:lvl6pPr marL="2286000" algn="l" defTabSz="457200" rtl="0" eaLnBrk="1" latinLnBrk="0" hangingPunct="1">
+              <a:defRPr sz="1800" kern="1200">
+                <a:solidFill>
+                  <a:schemeClr val="lt1"/>
+                </a:solidFill>
+                <a:latin typeface="+mn-lt"/>
+                <a:ea typeface="+mn-ea"/>
+                <a:cs typeface="+mn-cs"/>
+              </a:defRPr>
+            </a:lvl6pPr>
+            <a:lvl7pPr marL="2743200" algn="l" defTabSz="457200" rtl="0" eaLnBrk="1" latinLnBrk="0" hangingPunct="1">
+              <a:defRPr sz="1800" kern="1200">
+                <a:solidFill>
+                  <a:schemeClr val="lt1"/>
+                </a:solidFill>
+                <a:latin typeface="+mn-lt"/>
+                <a:ea typeface="+mn-ea"/>
+                <a:cs typeface="+mn-cs"/>
+              </a:defRPr>
+            </a:lvl7pPr>
+            <a:lvl8pPr marL="3200400" algn="l" defTabSz="457200" rtl="0" eaLnBrk="1" latinLnBrk="0" hangingPunct="1">
+              <a:defRPr sz="1800" kern="1200">
+                <a:solidFill>
+                  <a:schemeClr val="lt1"/>
+                </a:solidFill>
+                <a:latin typeface="+mn-lt"/>
+                <a:ea typeface="+mn-ea"/>
+                <a:cs typeface="+mn-cs"/>
+              </a:defRPr>
+            </a:lvl8pPr>
+            <a:lvl9pPr marL="3657600" algn="l" defTabSz="457200" rtl="0" eaLnBrk="1" latinLnBrk="0" hangingPunct="1">
+              <a:defRPr sz="1800" kern="1200">
+                <a:solidFill>
+                  <a:schemeClr val="lt1"/>
+                </a:solidFill>
+                <a:latin typeface="+mn-lt"/>
+                <a:ea typeface="+mn-ea"/>
+                <a:cs typeface="+mn-cs"/>
+              </a:defRPr>
+            </a:lvl9pPr>
+          </a:lstStyle>
+          <a:p>
+            <a:pPr algn="ctr"/>
+            <a:endParaRPr lang="it-IT"/>
+          </a:p>
+        </p:txBody>
+      </p:sp>
+      <p:sp>
+        <p:nvSpPr>
+          <p:cNvPr id="226" name="Oval 32"/>
+          <p:cNvSpPr/>
+          <p:nvPr/>
+        </p:nvSpPr>
+        <p:spPr>
+          <a:xfrm>
+            <a:off x="2495600" y="4523536"/>
+            <a:ext cx="129600" cy="129600"/>
           </a:xfrm>
           <a:prstGeom prst="ellipse">
             <a:avLst/>
@@ -19278,9 +19276,9 @@
         <p:grpSpPr>
           <a:xfrm>
             <a:off x="13091" y="3668286"/>
-            <a:ext cx="2667100" cy="1319463"/>
+            <a:ext cx="2667100" cy="2088225"/>
             <a:chOff x="-841046" y="4185608"/>
-            <a:chExt cx="3046228" cy="2443792"/>
+            <a:chExt cx="3046228" cy="3867624"/>
           </a:xfrm>
         </p:grpSpPr>
         <p:grpSp>
@@ -19292,9 +19290,9 @@
           <p:grpSpPr>
             <a:xfrm>
               <a:off x="381000" y="4185608"/>
-              <a:ext cx="1824182" cy="2443792"/>
+              <a:ext cx="1824182" cy="3867624"/>
               <a:chOff x="436585" y="4109408"/>
-              <a:chExt cx="1824182" cy="2443792"/>
+              <a:chExt cx="1824182" cy="3867624"/>
             </a:xfrm>
           </p:grpSpPr>
           <p:sp>
@@ -19306,7 +19304,7 @@
             <p:spPr>
               <a:xfrm>
                 <a:off x="436585" y="4109408"/>
-                <a:ext cx="1824182" cy="2443792"/>
+                <a:ext cx="1824182" cy="3867624"/>
               </a:xfrm>
               <a:prstGeom prst="rect">
                 <a:avLst/>
@@ -19350,7 +19348,7 @@
             <p:spPr>
               <a:xfrm>
                 <a:off x="512784" y="4188304"/>
-                <a:ext cx="1676400" cy="2286000"/>
+                <a:ext cx="1676400" cy="3649484"/>
               </a:xfrm>
               <a:prstGeom prst="rect">
                 <a:avLst/>
@@ -19424,8 +19422,8 @@
           </p:nvSpPr>
           <p:spPr>
             <a:xfrm>
-              <a:off x="774982" y="4713927"/>
-              <a:ext cx="1126754" cy="1387155"/>
+              <a:off x="774982" y="4580235"/>
+              <a:ext cx="1126754" cy="1201248"/>
             </a:xfrm>
             <a:prstGeom prst="snip1Rect">
               <a:avLst/>
@@ -19509,7 +19507,7 @@
         <p:spPr>
           <a:xfrm flipH="1">
             <a:off x="2680191" y="3740095"/>
-            <a:ext cx="1319424" cy="587923"/>
+            <a:ext cx="1319424" cy="972304"/>
           </a:xfrm>
           <a:prstGeom prst="straightConnector1">
             <a:avLst/>
@@ -19544,7 +19542,7 @@
         </p:nvSpPr>
         <p:spPr>
           <a:xfrm>
-            <a:off x="2909814" y="4049940"/>
+            <a:off x="3101327" y="4049940"/>
             <a:ext cx="976055" cy="369332"/>
           </a:xfrm>
           <a:prstGeom prst="rect">
@@ -19586,7 +19584,7 @@
         </p:nvSpPr>
         <p:spPr>
           <a:xfrm>
-            <a:off x="2224335" y="3228128"/>
+            <a:off x="2296148" y="3254469"/>
             <a:ext cx="976055" cy="369332"/>
           </a:xfrm>
           <a:prstGeom prst="rect">
@@ -22348,48 +22346,6 @@
       </p:sp>
       <p:sp>
         <p:nvSpPr>
-          <p:cNvPr id="421" name="Snip Single Corner Rectangle 73"/>
-          <p:cNvSpPr/>
-          <p:nvPr/>
-        </p:nvSpPr>
-        <p:spPr>
-          <a:xfrm>
-            <a:off x="8761216" y="5760862"/>
-            <a:ext cx="1147166" cy="597839"/>
-          </a:xfrm>
-          <a:prstGeom prst="snip1Rect">
-            <a:avLst/>
-          </a:prstGeom>
-        </p:spPr>
-        <p:style>
-          <a:lnRef idx="2">
-            <a:schemeClr val="dk1"/>
-          </a:lnRef>
-          <a:fillRef idx="1">
-            <a:schemeClr val="lt1"/>
-          </a:fillRef>
-          <a:effectRef idx="0">
-            <a:schemeClr val="dk1"/>
-          </a:effectRef>
-          <a:fontRef idx="minor">
-            <a:schemeClr val="dk1"/>
-          </a:fontRef>
-        </p:style>
-        <p:txBody>
-          <a:bodyPr rtlCol="0" anchor="ctr"/>
-          <a:lstStyle/>
-          <a:p>
-            <a:pPr algn="ctr"/>
-            <a:r>
-              <a:rPr lang="it-IT" sz="1200" dirty="0" smtClean="0"/>
-              <a:t>FAQ</a:t>
-            </a:r>
-            <a:endParaRPr lang="it-IT" sz="1200" dirty="0"/>
-          </a:p>
-        </p:txBody>
-      </p:sp>
-      <p:sp>
-        <p:nvSpPr>
           <p:cNvPr id="423" name="TextBox 50"/>
           <p:cNvSpPr txBox="1"/>
           <p:nvPr/>
@@ -23069,7 +23025,7 @@
         </p:nvGrpSpPr>
         <p:grpSpPr>
           <a:xfrm>
-            <a:off x="3062761" y="5324401"/>
+            <a:off x="3201029" y="5309208"/>
             <a:ext cx="461080" cy="464317"/>
             <a:chOff x="3085399" y="5531474"/>
             <a:chExt cx="518422" cy="574918"/>
@@ -23541,8 +23497,8 @@
         </p:nvCxnSpPr>
         <p:spPr>
           <a:xfrm flipH="1" flipV="1">
-            <a:off x="3523841" y="5585643"/>
-            <a:ext cx="1087714" cy="2992"/>
+            <a:off x="3662109" y="5570450"/>
+            <a:ext cx="949446" cy="18185"/>
           </a:xfrm>
           <a:prstGeom prst="straightConnector1">
             <a:avLst/>
@@ -23577,8 +23533,8 @@
         </p:nvCxnSpPr>
         <p:spPr>
           <a:xfrm flipH="1" flipV="1">
-            <a:off x="2275136" y="5005181"/>
-            <a:ext cx="925254" cy="580462"/>
+            <a:off x="2631829" y="5396503"/>
+            <a:ext cx="706829" cy="173947"/>
           </a:xfrm>
           <a:prstGeom prst="straightConnector1">
             <a:avLst/>
@@ -23615,8 +23571,8 @@
         </p:nvCxnSpPr>
         <p:spPr>
           <a:xfrm>
-            <a:off x="1504227" y="5005181"/>
-            <a:ext cx="861599" cy="1198583"/>
+            <a:off x="1655230" y="5904334"/>
+            <a:ext cx="710596" cy="299430"/>
           </a:xfrm>
           <a:prstGeom prst="straightConnector1">
             <a:avLst/>
@@ -23687,7 +23643,7 @@
         </p:nvSpPr>
         <p:spPr>
           <a:xfrm>
-            <a:off x="3004398" y="5119995"/>
+            <a:off x="2986227" y="4905771"/>
             <a:ext cx="1361796" cy="461665"/>
           </a:xfrm>
           <a:prstGeom prst="rect">
@@ -23736,7 +23692,7 @@
         </p:nvSpPr>
         <p:spPr>
           <a:xfrm>
-            <a:off x="1322861" y="6310859"/>
+            <a:off x="1108059" y="6297726"/>
             <a:ext cx="1361796" cy="461665"/>
           </a:xfrm>
           <a:prstGeom prst="rect">
@@ -23785,7 +23741,7 @@
         </p:nvSpPr>
         <p:spPr>
           <a:xfrm>
-            <a:off x="2063393" y="5155468"/>
+            <a:off x="2478748" y="5469719"/>
             <a:ext cx="976055" cy="369332"/>
           </a:xfrm>
           <a:prstGeom prst="rect">
@@ -24865,7 +24821,7 @@
         </p:nvGrpSpPr>
         <p:grpSpPr>
           <a:xfrm>
-            <a:off x="10059240" y="5756511"/>
+            <a:off x="9381928" y="5756511"/>
             <a:ext cx="1165906" cy="869796"/>
             <a:chOff x="4832902" y="2182022"/>
             <a:chExt cx="1106156" cy="869796"/>
@@ -26803,6 +26759,200 @@
           </a:p>
         </p:txBody>
       </p:sp>
+      <p:sp>
+        <p:nvSpPr>
+          <p:cNvPr id="234" name="Snip Single Corner Rectangle 73"/>
+          <p:cNvSpPr/>
+          <p:nvPr/>
+        </p:nvSpPr>
+        <p:spPr>
+          <a:xfrm>
+            <a:off x="1427991" y="4897202"/>
+            <a:ext cx="986520" cy="648175"/>
+          </a:xfrm>
+          <a:prstGeom prst="snip1Rect">
+            <a:avLst/>
+          </a:prstGeom>
+        </p:spPr>
+        <p:style>
+          <a:lnRef idx="2">
+            <a:schemeClr val="dk1"/>
+          </a:lnRef>
+          <a:fillRef idx="1">
+            <a:schemeClr val="lt1"/>
+          </a:fillRef>
+          <a:effectRef idx="0">
+            <a:schemeClr val="dk1"/>
+          </a:effectRef>
+          <a:fontRef idx="minor">
+            <a:schemeClr val="dk1"/>
+          </a:fontRef>
+        </p:style>
+        <p:txBody>
+          <a:bodyPr rtlCol="0" anchor="ctr"/>
+          <a:lstStyle/>
+          <a:p>
+            <a:pPr algn="ctr"/>
+            <a:r>
+              <a:rPr lang="it-IT" sz="1200" dirty="0" smtClean="0"/>
+              <a:t>FAQ</a:t>
+            </a:r>
+            <a:endParaRPr lang="it-IT" sz="1200" dirty="0"/>
+          </a:p>
+        </p:txBody>
+      </p:sp>
+      <p:cxnSp>
+        <p:nvCxnSpPr>
+          <p:cNvPr id="23" name="Connettore 2 22"/>
+          <p:cNvCxnSpPr>
+            <a:stCxn id="266" idx="1"/>
+            <a:endCxn id="234" idx="3"/>
+          </p:cNvCxnSpPr>
+          <p:nvPr/>
+        </p:nvCxnSpPr>
+        <p:spPr>
+          <a:xfrm>
+            <a:off x="1921251" y="4529938"/>
+            <a:ext cx="0" cy="367264"/>
+          </a:xfrm>
+          <a:prstGeom prst="straightConnector1">
+            <a:avLst/>
+          </a:prstGeom>
+          <a:ln w="19050">
+            <a:solidFill>
+              <a:schemeClr val="tx1"/>
+            </a:solidFill>
+            <a:headEnd type="arrow"/>
+            <a:tailEnd type="arrow"/>
+          </a:ln>
+        </p:spPr>
+        <p:style>
+          <a:lnRef idx="1">
+            <a:schemeClr val="dk1"/>
+          </a:lnRef>
+          <a:fillRef idx="0">
+            <a:schemeClr val="dk1"/>
+          </a:fillRef>
+          <a:effectRef idx="0">
+            <a:schemeClr val="dk1"/>
+          </a:effectRef>
+          <a:fontRef idx="minor">
+            <a:schemeClr val="tx1"/>
+          </a:fontRef>
+        </p:style>
+      </p:cxnSp>
+      <p:sp>
+        <p:nvSpPr>
+          <p:cNvPr id="247" name="Rectangle 25"/>
+          <p:cNvSpPr/>
+          <p:nvPr/>
+        </p:nvSpPr>
+        <p:spPr>
+          <a:xfrm>
+            <a:off x="2577691" y="3699827"/>
+            <a:ext cx="542912" cy="199758"/>
+          </a:xfrm>
+          <a:prstGeom prst="rect">
+            <a:avLst/>
+          </a:prstGeom>
+        </p:spPr>
+        <p:style>
+          <a:lnRef idx="1">
+            <a:schemeClr val="dk1"/>
+          </a:lnRef>
+          <a:fillRef idx="3">
+            <a:schemeClr val="dk1"/>
+          </a:fillRef>
+          <a:effectRef idx="2">
+            <a:schemeClr val="dk1"/>
+          </a:effectRef>
+          <a:fontRef idx="minor">
+            <a:schemeClr val="lt1"/>
+          </a:fontRef>
+        </p:style>
+        <p:txBody>
+          <a:bodyPr rtlCol="0" anchor="ctr"/>
+          <a:lstStyle/>
+          <a:p>
+            <a:pPr algn="ctr"/>
+            <a:endParaRPr lang="it-IT"/>
+          </a:p>
+        </p:txBody>
+      </p:sp>
+      <p:cxnSp>
+        <p:nvCxnSpPr>
+          <p:cNvPr id="249" name="Straight Arrow Connector 29"/>
+          <p:cNvCxnSpPr>
+            <a:stCxn id="247" idx="2"/>
+            <a:endCxn id="266" idx="0"/>
+          </p:cNvCxnSpPr>
+          <p:nvPr/>
+        </p:nvCxnSpPr>
+        <p:spPr>
+          <a:xfrm flipH="1">
+            <a:off x="2414511" y="3899585"/>
+            <a:ext cx="434636" cy="306062"/>
+          </a:xfrm>
+          <a:prstGeom prst="straightConnector1">
+            <a:avLst/>
+          </a:prstGeom>
+          <a:ln>
+            <a:tailEnd type="arrow"/>
+          </a:ln>
+        </p:spPr>
+        <p:style>
+          <a:lnRef idx="2">
+            <a:schemeClr val="dk1"/>
+          </a:lnRef>
+          <a:fillRef idx="0">
+            <a:schemeClr val="dk1"/>
+          </a:fillRef>
+          <a:effectRef idx="1">
+            <a:schemeClr val="dk1"/>
+          </a:effectRef>
+          <a:fontRef idx="minor">
+            <a:schemeClr val="tx1"/>
+          </a:fontRef>
+        </p:style>
+      </p:cxnSp>
+      <p:sp>
+        <p:nvSpPr>
+          <p:cNvPr id="250" name="Rectangle 25"/>
+          <p:cNvSpPr/>
+          <p:nvPr/>
+        </p:nvSpPr>
+        <p:spPr>
+          <a:xfrm rot="10800000">
+            <a:off x="1415480" y="5732020"/>
+            <a:ext cx="460039" cy="137626"/>
+          </a:xfrm>
+          <a:prstGeom prst="rect">
+            <a:avLst/>
+          </a:prstGeom>
+        </p:spPr>
+        <p:style>
+          <a:lnRef idx="1">
+            <a:schemeClr val="dk1"/>
+          </a:lnRef>
+          <a:fillRef idx="3">
+            <a:schemeClr val="dk1"/>
+          </a:fillRef>
+          <a:effectRef idx="2">
+            <a:schemeClr val="dk1"/>
+          </a:effectRef>
+          <a:fontRef idx="minor">
+            <a:schemeClr val="lt1"/>
+          </a:fontRef>
+        </p:style>
+        <p:txBody>
+          <a:bodyPr rtlCol="0" anchor="ctr"/>
+          <a:lstStyle/>
+          <a:p>
+            <a:pPr algn="ctr"/>
+            <a:endParaRPr lang="it-IT"/>
+          </a:p>
+        </p:txBody>
+      </p:sp>
     </p:spTree>
     <p:extLst>
       <p:ext uri="{BB962C8B-B14F-4D97-AF65-F5344CB8AC3E}">
@@ -27361,7 +27511,7 @@
   <a:extraClrSchemeLst/>
   <a:extLst>
     <a:ext uri="{05A4C25C-085E-4340-85A3-A5531E510DB2}">
-      <thm15:themeFamily xmlns:thm15="http://schemas.microsoft.com/office/thememl/2012/main" name="Office Theme" id="{62F939B6-93AF-4DB8-9C6B-D6C7DFDC589F}" vid="{4A3C46E8-61CC-4603-A589-7422A47A8E4A}"/>
+      <thm15:themeFamily xmlns:thm15="http://schemas.microsoft.com/office/thememl/2012/main" xmlns="" name="Office Theme" id="{62F939B6-93AF-4DB8-9C6B-D6C7DFDC589F}" vid="{4A3C46E8-61CC-4603-A589-7422A47A8E4A}"/>
     </a:ext>
   </a:extLst>
 </a:theme>

</xml_diff>

<commit_message>
new-new p-idm (nuovo filtro su assistance)
new
</commit_message>
<xml_diff>
--- a/1st delivery/C-IDM.pptx
+++ b/1st delivery/C-IDM.pptx
@@ -111,7 +111,7 @@
   </p:defaultTextStyle>
   <p:extLst>
     <p:ext uri="{EFAFB233-063F-42B5-8137-9DF3F51BA10A}">
-      <p15:sldGuideLst xmlns:p15="http://schemas.microsoft.com/office/powerpoint/2012/main" xmlns="">
+      <p15:sldGuideLst xmlns="" xmlns:p15="http://schemas.microsoft.com/office/powerpoint/2012/main">
         <p15:guide id="1" orient="horz" pos="2160" userDrawn="1">
           <p15:clr>
             <a:srgbClr val="A4A3A4"/>
@@ -250,7 +250,7 @@
           <a:p>
             <a:fld id="{51EC9344-52F1-48B5-A731-0BE7C59899F1}" type="datetimeFigureOut">
               <a:rPr lang="it-IT" smtClean="0"/>
-              <a:t>21/04/2016</a:t>
+              <a:t>27/04/2016</a:t>
             </a:fld>
             <a:endParaRPr lang="it-IT"/>
           </a:p>
@@ -873,7 +873,7 @@
             <a:fld id="{DA9D7BA9-B648-4591-B0AE-4433C67759B9}" type="datetimeFigureOut">
               <a:rPr lang="it-IT" smtClean="0"/>
               <a:pPr/>
-              <a:t>21/04/2016</a:t>
+              <a:t>27/04/2016</a:t>
             </a:fld>
             <a:endParaRPr lang="it-IT"/>
           </a:p>
@@ -1040,7 +1040,7 @@
             <a:fld id="{DA9D7BA9-B648-4591-B0AE-4433C67759B9}" type="datetimeFigureOut">
               <a:rPr lang="it-IT" smtClean="0"/>
               <a:pPr/>
-              <a:t>21/04/2016</a:t>
+              <a:t>27/04/2016</a:t>
             </a:fld>
             <a:endParaRPr lang="it-IT"/>
           </a:p>
@@ -1217,7 +1217,7 @@
             <a:fld id="{DA9D7BA9-B648-4591-B0AE-4433C67759B9}" type="datetimeFigureOut">
               <a:rPr lang="it-IT" smtClean="0"/>
               <a:pPr/>
-              <a:t>21/04/2016</a:t>
+              <a:t>27/04/2016</a:t>
             </a:fld>
             <a:endParaRPr lang="it-IT"/>
           </a:p>
@@ -1384,7 +1384,7 @@
             <a:fld id="{DA9D7BA9-B648-4591-B0AE-4433C67759B9}" type="datetimeFigureOut">
               <a:rPr lang="it-IT" smtClean="0"/>
               <a:pPr/>
-              <a:t>21/04/2016</a:t>
+              <a:t>27/04/2016</a:t>
             </a:fld>
             <a:endParaRPr lang="it-IT"/>
           </a:p>
@@ -1627,7 +1627,7 @@
             <a:fld id="{DA9D7BA9-B648-4591-B0AE-4433C67759B9}" type="datetimeFigureOut">
               <a:rPr lang="it-IT" smtClean="0"/>
               <a:pPr/>
-              <a:t>21/04/2016</a:t>
+              <a:t>27/04/2016</a:t>
             </a:fld>
             <a:endParaRPr lang="it-IT"/>
           </a:p>
@@ -1912,7 +1912,7 @@
             <a:fld id="{DA9D7BA9-B648-4591-B0AE-4433C67759B9}" type="datetimeFigureOut">
               <a:rPr lang="it-IT" smtClean="0"/>
               <a:pPr/>
-              <a:t>21/04/2016</a:t>
+              <a:t>27/04/2016</a:t>
             </a:fld>
             <a:endParaRPr lang="it-IT"/>
           </a:p>
@@ -2331,7 +2331,7 @@
             <a:fld id="{DA9D7BA9-B648-4591-B0AE-4433C67759B9}" type="datetimeFigureOut">
               <a:rPr lang="it-IT" smtClean="0"/>
               <a:pPr/>
-              <a:t>21/04/2016</a:t>
+              <a:t>27/04/2016</a:t>
             </a:fld>
             <a:endParaRPr lang="it-IT"/>
           </a:p>
@@ -2446,7 +2446,7 @@
             <a:fld id="{DA9D7BA9-B648-4591-B0AE-4433C67759B9}" type="datetimeFigureOut">
               <a:rPr lang="it-IT" smtClean="0"/>
               <a:pPr/>
-              <a:t>21/04/2016</a:t>
+              <a:t>27/04/2016</a:t>
             </a:fld>
             <a:endParaRPr lang="it-IT"/>
           </a:p>
@@ -2538,7 +2538,7 @@
             <a:fld id="{DA9D7BA9-B648-4591-B0AE-4433C67759B9}" type="datetimeFigureOut">
               <a:rPr lang="it-IT" smtClean="0"/>
               <a:pPr/>
-              <a:t>21/04/2016</a:t>
+              <a:t>27/04/2016</a:t>
             </a:fld>
             <a:endParaRPr lang="it-IT"/>
           </a:p>
@@ -2812,7 +2812,7 @@
             <a:fld id="{DA9D7BA9-B648-4591-B0AE-4433C67759B9}" type="datetimeFigureOut">
               <a:rPr lang="it-IT" smtClean="0"/>
               <a:pPr/>
-              <a:t>21/04/2016</a:t>
+              <a:t>27/04/2016</a:t>
             </a:fld>
             <a:endParaRPr lang="it-IT"/>
           </a:p>
@@ -3062,7 +3062,7 @@
             <a:fld id="{DA9D7BA9-B648-4591-B0AE-4433C67759B9}" type="datetimeFigureOut">
               <a:rPr lang="it-IT" smtClean="0"/>
               <a:pPr/>
-              <a:t>21/04/2016</a:t>
+              <a:t>27/04/2016</a:t>
             </a:fld>
             <a:endParaRPr lang="it-IT"/>
           </a:p>
@@ -3272,7 +3272,7 @@
             <a:fld id="{DA9D7BA9-B648-4591-B0AE-4433C67759B9}" type="datetimeFigureOut">
               <a:rPr lang="it-IT" smtClean="0"/>
               <a:pPr/>
-              <a:t>21/04/2016</a:t>
+              <a:t>27/04/2016</a:t>
             </a:fld>
             <a:endParaRPr lang="it-IT"/>
           </a:p>
@@ -8804,7 +8804,6 @@
                   <a:rPr lang="it-IT" sz="1400" dirty="0" smtClean="0"/>
                   <a:t> to service</a:t>
                 </a:r>
-                <a:endParaRPr lang="it-IT" sz="1400" dirty="0" smtClean="0"/>
               </a:p>
             </p:txBody>
           </p:sp>
@@ -10052,7 +10051,6 @@
                 <a:rPr lang="it-IT" sz="1400" dirty="0" smtClean="0"/>
                 <a:t>FAQ</a:t>
               </a:r>
-              <a:endParaRPr lang="it-IT" sz="1400" dirty="0" smtClean="0"/>
             </a:p>
           </p:txBody>
         </p:sp>
@@ -26953,6 +26951,269 @@
           </a:p>
         </p:txBody>
       </p:sp>
+      <p:sp>
+        <p:nvSpPr>
+          <p:cNvPr id="233" name="Esagono 21"/>
+          <p:cNvSpPr/>
+          <p:nvPr/>
+        </p:nvSpPr>
+        <p:spPr>
+          <a:xfrm>
+            <a:off x="4079776" y="3066746"/>
+            <a:ext cx="250266" cy="290246"/>
+          </a:xfrm>
+          <a:custGeom>
+            <a:avLst/>
+            <a:gdLst>
+              <a:gd name="connsiteX0" fmla="*/ 0 w 416721"/>
+              <a:gd name="connsiteY0" fmla="*/ 164667 h 329333"/>
+              <a:gd name="connsiteX1" fmla="*/ 82333 w 416721"/>
+              <a:gd name="connsiteY1" fmla="*/ 0 h 329333"/>
+              <a:gd name="connsiteX2" fmla="*/ 334388 w 416721"/>
+              <a:gd name="connsiteY2" fmla="*/ 0 h 329333"/>
+              <a:gd name="connsiteX3" fmla="*/ 416721 w 416721"/>
+              <a:gd name="connsiteY3" fmla="*/ 164667 h 329333"/>
+              <a:gd name="connsiteX4" fmla="*/ 334388 w 416721"/>
+              <a:gd name="connsiteY4" fmla="*/ 329333 h 329333"/>
+              <a:gd name="connsiteX5" fmla="*/ 82333 w 416721"/>
+              <a:gd name="connsiteY5" fmla="*/ 329333 h 329333"/>
+              <a:gd name="connsiteX6" fmla="*/ 0 w 416721"/>
+              <a:gd name="connsiteY6" fmla="*/ 164667 h 329333"/>
+              <a:gd name="connsiteX0" fmla="*/ 131027 w 334388"/>
+              <a:gd name="connsiteY0" fmla="*/ 166572 h 329333"/>
+              <a:gd name="connsiteX1" fmla="*/ 0 w 334388"/>
+              <a:gd name="connsiteY1" fmla="*/ 0 h 329333"/>
+              <a:gd name="connsiteX2" fmla="*/ 252055 w 334388"/>
+              <a:gd name="connsiteY2" fmla="*/ 0 h 329333"/>
+              <a:gd name="connsiteX3" fmla="*/ 334388 w 334388"/>
+              <a:gd name="connsiteY3" fmla="*/ 164667 h 329333"/>
+              <a:gd name="connsiteX4" fmla="*/ 252055 w 334388"/>
+              <a:gd name="connsiteY4" fmla="*/ 329333 h 329333"/>
+              <a:gd name="connsiteX5" fmla="*/ 0 w 334388"/>
+              <a:gd name="connsiteY5" fmla="*/ 329333 h 329333"/>
+              <a:gd name="connsiteX6" fmla="*/ 131027 w 334388"/>
+              <a:gd name="connsiteY6" fmla="*/ 166572 h 329333"/>
+              <a:gd name="connsiteX0" fmla="*/ 131027 w 252055"/>
+              <a:gd name="connsiteY0" fmla="*/ 166572 h 329333"/>
+              <a:gd name="connsiteX1" fmla="*/ 0 w 252055"/>
+              <a:gd name="connsiteY1" fmla="*/ 0 h 329333"/>
+              <a:gd name="connsiteX2" fmla="*/ 252055 w 252055"/>
+              <a:gd name="connsiteY2" fmla="*/ 0 h 329333"/>
+              <a:gd name="connsiteX3" fmla="*/ 157223 w 252055"/>
+              <a:gd name="connsiteY3" fmla="*/ 166572 h 329333"/>
+              <a:gd name="connsiteX4" fmla="*/ 252055 w 252055"/>
+              <a:gd name="connsiteY4" fmla="*/ 329333 h 329333"/>
+              <a:gd name="connsiteX5" fmla="*/ 0 w 252055"/>
+              <a:gd name="connsiteY5" fmla="*/ 329333 h 329333"/>
+              <a:gd name="connsiteX6" fmla="*/ 131027 w 252055"/>
+              <a:gd name="connsiteY6" fmla="*/ 166572 h 329333"/>
+              <a:gd name="connsiteX0" fmla="*/ 131027 w 252055"/>
+              <a:gd name="connsiteY0" fmla="*/ 166572 h 329333"/>
+              <a:gd name="connsiteX1" fmla="*/ 0 w 252055"/>
+              <a:gd name="connsiteY1" fmla="*/ 0 h 329333"/>
+              <a:gd name="connsiteX2" fmla="*/ 252055 w 252055"/>
+              <a:gd name="connsiteY2" fmla="*/ 0 h 329333"/>
+              <a:gd name="connsiteX3" fmla="*/ 157223 w 252055"/>
+              <a:gd name="connsiteY3" fmla="*/ 166572 h 329333"/>
+              <a:gd name="connsiteX4" fmla="*/ 166330 w 252055"/>
+              <a:gd name="connsiteY4" fmla="*/ 321713 h 329333"/>
+              <a:gd name="connsiteX5" fmla="*/ 0 w 252055"/>
+              <a:gd name="connsiteY5" fmla="*/ 329333 h 329333"/>
+              <a:gd name="connsiteX6" fmla="*/ 131027 w 252055"/>
+              <a:gd name="connsiteY6" fmla="*/ 166572 h 329333"/>
+              <a:gd name="connsiteX0" fmla="*/ 131027 w 252055"/>
+              <a:gd name="connsiteY0" fmla="*/ 166572 h 333143"/>
+              <a:gd name="connsiteX1" fmla="*/ 0 w 252055"/>
+              <a:gd name="connsiteY1" fmla="*/ 0 h 333143"/>
+              <a:gd name="connsiteX2" fmla="*/ 252055 w 252055"/>
+              <a:gd name="connsiteY2" fmla="*/ 0 h 333143"/>
+              <a:gd name="connsiteX3" fmla="*/ 157223 w 252055"/>
+              <a:gd name="connsiteY3" fmla="*/ 166572 h 333143"/>
+              <a:gd name="connsiteX4" fmla="*/ 166330 w 252055"/>
+              <a:gd name="connsiteY4" fmla="*/ 321713 h 333143"/>
+              <a:gd name="connsiteX5" fmla="*/ 131445 w 252055"/>
+              <a:gd name="connsiteY5" fmla="*/ 333143 h 333143"/>
+              <a:gd name="connsiteX6" fmla="*/ 131027 w 252055"/>
+              <a:gd name="connsiteY6" fmla="*/ 166572 h 333143"/>
+              <a:gd name="connsiteX0" fmla="*/ 131027 w 252055"/>
+              <a:gd name="connsiteY0" fmla="*/ 166572 h 354098"/>
+              <a:gd name="connsiteX1" fmla="*/ 0 w 252055"/>
+              <a:gd name="connsiteY1" fmla="*/ 0 h 354098"/>
+              <a:gd name="connsiteX2" fmla="*/ 252055 w 252055"/>
+              <a:gd name="connsiteY2" fmla="*/ 0 h 354098"/>
+              <a:gd name="connsiteX3" fmla="*/ 157223 w 252055"/>
+              <a:gd name="connsiteY3" fmla="*/ 166572 h 354098"/>
+              <a:gd name="connsiteX4" fmla="*/ 158710 w 252055"/>
+              <a:gd name="connsiteY4" fmla="*/ 354098 h 354098"/>
+              <a:gd name="connsiteX5" fmla="*/ 131445 w 252055"/>
+              <a:gd name="connsiteY5" fmla="*/ 333143 h 354098"/>
+              <a:gd name="connsiteX6" fmla="*/ 131027 w 252055"/>
+              <a:gd name="connsiteY6" fmla="*/ 166572 h 354098"/>
+              <a:gd name="connsiteX0" fmla="*/ 131027 w 288250"/>
+              <a:gd name="connsiteY0" fmla="*/ 166572 h 354098"/>
+              <a:gd name="connsiteX1" fmla="*/ 0 w 288250"/>
+              <a:gd name="connsiteY1" fmla="*/ 0 h 354098"/>
+              <a:gd name="connsiteX2" fmla="*/ 288250 w 288250"/>
+              <a:gd name="connsiteY2" fmla="*/ 0 h 354098"/>
+              <a:gd name="connsiteX3" fmla="*/ 157223 w 288250"/>
+              <a:gd name="connsiteY3" fmla="*/ 166572 h 354098"/>
+              <a:gd name="connsiteX4" fmla="*/ 158710 w 288250"/>
+              <a:gd name="connsiteY4" fmla="*/ 354098 h 354098"/>
+              <a:gd name="connsiteX5" fmla="*/ 131445 w 288250"/>
+              <a:gd name="connsiteY5" fmla="*/ 333143 h 354098"/>
+              <a:gd name="connsiteX6" fmla="*/ 131027 w 288250"/>
+              <a:gd name="connsiteY6" fmla="*/ 166572 h 354098"/>
+              <a:gd name="connsiteX0" fmla="*/ 123407 w 288250"/>
+              <a:gd name="connsiteY0" fmla="*/ 164667 h 354098"/>
+              <a:gd name="connsiteX1" fmla="*/ 0 w 288250"/>
+              <a:gd name="connsiteY1" fmla="*/ 0 h 354098"/>
+              <a:gd name="connsiteX2" fmla="*/ 288250 w 288250"/>
+              <a:gd name="connsiteY2" fmla="*/ 0 h 354098"/>
+              <a:gd name="connsiteX3" fmla="*/ 157223 w 288250"/>
+              <a:gd name="connsiteY3" fmla="*/ 166572 h 354098"/>
+              <a:gd name="connsiteX4" fmla="*/ 158710 w 288250"/>
+              <a:gd name="connsiteY4" fmla="*/ 354098 h 354098"/>
+              <a:gd name="connsiteX5" fmla="*/ 131445 w 288250"/>
+              <a:gd name="connsiteY5" fmla="*/ 333143 h 354098"/>
+              <a:gd name="connsiteX6" fmla="*/ 123407 w 288250"/>
+              <a:gd name="connsiteY6" fmla="*/ 164667 h 354098"/>
+              <a:gd name="connsiteX0" fmla="*/ 123407 w 288250"/>
+              <a:gd name="connsiteY0" fmla="*/ 164667 h 354098"/>
+              <a:gd name="connsiteX1" fmla="*/ 0 w 288250"/>
+              <a:gd name="connsiteY1" fmla="*/ 0 h 354098"/>
+              <a:gd name="connsiteX2" fmla="*/ 288250 w 288250"/>
+              <a:gd name="connsiteY2" fmla="*/ 0 h 354098"/>
+              <a:gd name="connsiteX3" fmla="*/ 170558 w 288250"/>
+              <a:gd name="connsiteY3" fmla="*/ 162762 h 354098"/>
+              <a:gd name="connsiteX4" fmla="*/ 158710 w 288250"/>
+              <a:gd name="connsiteY4" fmla="*/ 354098 h 354098"/>
+              <a:gd name="connsiteX5" fmla="*/ 131445 w 288250"/>
+              <a:gd name="connsiteY5" fmla="*/ 333143 h 354098"/>
+              <a:gd name="connsiteX6" fmla="*/ 123407 w 288250"/>
+              <a:gd name="connsiteY6" fmla="*/ 164667 h 354098"/>
+              <a:gd name="connsiteX0" fmla="*/ 123407 w 288250"/>
+              <a:gd name="connsiteY0" fmla="*/ 164667 h 354098"/>
+              <a:gd name="connsiteX1" fmla="*/ 0 w 288250"/>
+              <a:gd name="connsiteY1" fmla="*/ 0 h 354098"/>
+              <a:gd name="connsiteX2" fmla="*/ 288250 w 288250"/>
+              <a:gd name="connsiteY2" fmla="*/ 0 h 354098"/>
+              <a:gd name="connsiteX3" fmla="*/ 170558 w 288250"/>
+              <a:gd name="connsiteY3" fmla="*/ 162762 h 354098"/>
+              <a:gd name="connsiteX4" fmla="*/ 158710 w 288250"/>
+              <a:gd name="connsiteY4" fmla="*/ 354098 h 354098"/>
+              <a:gd name="connsiteX5" fmla="*/ 114300 w 288250"/>
+              <a:gd name="connsiteY5" fmla="*/ 319808 h 354098"/>
+              <a:gd name="connsiteX6" fmla="*/ 123407 w 288250"/>
+              <a:gd name="connsiteY6" fmla="*/ 164667 h 354098"/>
+              <a:gd name="connsiteX0" fmla="*/ 123407 w 288250"/>
+              <a:gd name="connsiteY0" fmla="*/ 164667 h 354098"/>
+              <a:gd name="connsiteX1" fmla="*/ 0 w 288250"/>
+              <a:gd name="connsiteY1" fmla="*/ 0 h 354098"/>
+              <a:gd name="connsiteX2" fmla="*/ 288250 w 288250"/>
+              <a:gd name="connsiteY2" fmla="*/ 0 h 354098"/>
+              <a:gd name="connsiteX3" fmla="*/ 170558 w 288250"/>
+              <a:gd name="connsiteY3" fmla="*/ 162762 h 354098"/>
+              <a:gd name="connsiteX4" fmla="*/ 158710 w 288250"/>
+              <a:gd name="connsiteY4" fmla="*/ 354098 h 354098"/>
+              <a:gd name="connsiteX5" fmla="*/ 120015 w 288250"/>
+              <a:gd name="connsiteY5" fmla="*/ 317903 h 354098"/>
+              <a:gd name="connsiteX6" fmla="*/ 123407 w 288250"/>
+              <a:gd name="connsiteY6" fmla="*/ 164667 h 354098"/>
+              <a:gd name="connsiteX0" fmla="*/ 123407 w 288250"/>
+              <a:gd name="connsiteY0" fmla="*/ 164667 h 354098"/>
+              <a:gd name="connsiteX1" fmla="*/ 0 w 288250"/>
+              <a:gd name="connsiteY1" fmla="*/ 0 h 354098"/>
+              <a:gd name="connsiteX2" fmla="*/ 288250 w 288250"/>
+              <a:gd name="connsiteY2" fmla="*/ 0 h 354098"/>
+              <a:gd name="connsiteX3" fmla="*/ 170558 w 288250"/>
+              <a:gd name="connsiteY3" fmla="*/ 162762 h 354098"/>
+              <a:gd name="connsiteX4" fmla="*/ 164425 w 288250"/>
+              <a:gd name="connsiteY4" fmla="*/ 354098 h 354098"/>
+              <a:gd name="connsiteX5" fmla="*/ 120015 w 288250"/>
+              <a:gd name="connsiteY5" fmla="*/ 317903 h 354098"/>
+              <a:gd name="connsiteX6" fmla="*/ 123407 w 288250"/>
+              <a:gd name="connsiteY6" fmla="*/ 164667 h 354098"/>
+            </a:gdLst>
+            <a:ahLst/>
+            <a:cxnLst>
+              <a:cxn ang="0">
+                <a:pos x="connsiteX0" y="connsiteY0"/>
+              </a:cxn>
+              <a:cxn ang="0">
+                <a:pos x="connsiteX1" y="connsiteY1"/>
+              </a:cxn>
+              <a:cxn ang="0">
+                <a:pos x="connsiteX2" y="connsiteY2"/>
+              </a:cxn>
+              <a:cxn ang="0">
+                <a:pos x="connsiteX3" y="connsiteY3"/>
+              </a:cxn>
+              <a:cxn ang="0">
+                <a:pos x="connsiteX4" y="connsiteY4"/>
+              </a:cxn>
+              <a:cxn ang="0">
+                <a:pos x="connsiteX5" y="connsiteY5"/>
+              </a:cxn>
+              <a:cxn ang="0">
+                <a:pos x="connsiteX6" y="connsiteY6"/>
+              </a:cxn>
+            </a:cxnLst>
+            <a:rect l="l" t="t" r="r" b="b"/>
+            <a:pathLst>
+              <a:path w="288250" h="354098">
+                <a:moveTo>
+                  <a:pt x="123407" y="164667"/>
+                </a:moveTo>
+                <a:lnTo>
+                  <a:pt x="0" y="0"/>
+                </a:lnTo>
+                <a:lnTo>
+                  <a:pt x="288250" y="0"/>
+                </a:lnTo>
+                <a:lnTo>
+                  <a:pt x="170558" y="162762"/>
+                </a:lnTo>
+                <a:cubicBezTo>
+                  <a:pt x="171054" y="225271"/>
+                  <a:pt x="163929" y="291589"/>
+                  <a:pt x="164425" y="354098"/>
+                </a:cubicBezTo>
+                <a:lnTo>
+                  <a:pt x="120015" y="317903"/>
+                </a:lnTo>
+                <a:cubicBezTo>
+                  <a:pt x="119876" y="262379"/>
+                  <a:pt x="123546" y="220191"/>
+                  <a:pt x="123407" y="164667"/>
+                </a:cubicBezTo>
+                <a:close/>
+              </a:path>
+            </a:pathLst>
+          </a:custGeom>
+        </p:spPr>
+        <p:style>
+          <a:lnRef idx="2">
+            <a:schemeClr val="dk1"/>
+          </a:lnRef>
+          <a:fillRef idx="1">
+            <a:schemeClr val="lt1"/>
+          </a:fillRef>
+          <a:effectRef idx="0">
+            <a:schemeClr val="dk1"/>
+          </a:effectRef>
+          <a:fontRef idx="minor">
+            <a:schemeClr val="dk1"/>
+          </a:fontRef>
+        </p:style>
+        <p:txBody>
+          <a:bodyPr rtlCol="0" anchor="ctr"/>
+          <a:lstStyle/>
+          <a:p>
+            <a:pPr algn="ctr"/>
+            <a:endParaRPr lang="it-IT"/>
+          </a:p>
+        </p:txBody>
+      </p:sp>
     </p:spTree>
     <p:extLst>
       <p:ext uri="{BB962C8B-B14F-4D97-AF65-F5344CB8AC3E}">
@@ -27511,7 +27772,7 @@
   <a:extraClrSchemeLst/>
   <a:extLst>
     <a:ext uri="{05A4C25C-085E-4340-85A3-A5531E510DB2}">
-      <thm15:themeFamily xmlns:thm15="http://schemas.microsoft.com/office/thememl/2012/main" xmlns="" name="Office Theme" id="{62F939B6-93AF-4DB8-9C6B-D6C7DFDC589F}" vid="{4A3C46E8-61CC-4603-A589-7422A47A8E4A}"/>
+      <thm15:themeFamily xmlns="" xmlns:thm15="http://schemas.microsoft.com/office/thememl/2012/main" name="Office Theme" id="{62F939B6-93AF-4DB8-9C6B-D6C7DFDC589F}" vid="{4A3C46E8-61CC-4603-A589-7422A47A8E4A}"/>
     </a:ext>
   </a:extLst>
 </a:theme>

</xml_diff>